<commit_message>
More changes made to the presentation!
</commit_message>
<xml_diff>
--- a/PHP_MVC.pptx
+++ b/PHP_MVC.pptx
@@ -172,7 +172,7 @@
   </p:defaultTextStyle>
   <p:extLst>
     <p:ext uri="{EFAFB233-063F-42B5-8137-9DF3F51BA10A}">
-      <p15:sldGuideLst xmlns="" xmlns:p15="http://schemas.microsoft.com/office/powerpoint/2012/main">
+      <p15:sldGuideLst xmlns:p15="http://schemas.microsoft.com/office/powerpoint/2012/main" xmlns="">
         <p15:guide id="1" orient="horz" pos="2160">
           <p15:clr>
             <a:srgbClr val="A4A3A4"/>
@@ -186,7 +186,7 @@
       </p15:sldGuideLst>
     </p:ext>
     <p:ext uri="{2D200454-40CA-4A62-9FC3-DE9A4176ACB9}">
-      <p15:notesGuideLst xmlns="" xmlns:p15="http://schemas.microsoft.com/office/powerpoint/2012/main">
+      <p15:notesGuideLst xmlns:p15="http://schemas.microsoft.com/office/powerpoint/2012/main" xmlns="">
         <p15:guide id="1" orient="horz" pos="2928">
           <p15:clr>
             <a:srgbClr val="A4A3A4"/>
@@ -10707,11 +10707,6 @@
               </a:rPr>
               <a:t>Operators </a:t>
             </a:r>
-            <a:endParaRPr lang="en-US" sz="2800" dirty="0" smtClean="0">
-              <a:solidFill>
-                <a:srgbClr val="F4FCD8"/>
-              </a:solidFill>
-            </a:endParaRPr>
           </a:p>
           <a:p>
             <a:pPr>
@@ -10727,11 +10722,6 @@
               </a:rPr>
               <a:t>Statements</a:t>
             </a:r>
-            <a:endParaRPr lang="en-US" sz="2800" dirty="0" smtClean="0">
-              <a:solidFill>
-                <a:srgbClr val="F4FCD8"/>
-              </a:solidFill>
-            </a:endParaRPr>
           </a:p>
           <a:p>
             <a:pPr>
@@ -10760,7 +10750,22 @@
                   <a:srgbClr val="F4FCD8"/>
                 </a:solidFill>
               </a:rPr>
-              <a:t>Linking </a:t>
+              <a:t>Linking code files</a:t>
+            </a:r>
+          </a:p>
+          <a:p>
+            <a:pPr>
+              <a:lnSpc>
+                <a:spcPct val="100000"/>
+              </a:lnSpc>
+            </a:pPr>
+            <a:r>
+              <a:rPr lang="en-US" sz="2800" dirty="0">
+                <a:solidFill>
+                  <a:srgbClr val="F4FCD8"/>
+                </a:solidFill>
+              </a:rPr>
+              <a:t>Core </a:t>
             </a:r>
             <a:r>
               <a:rPr lang="en-US" sz="2800" dirty="0" smtClean="0">
@@ -10768,30 +10773,30 @@
                   <a:srgbClr val="F4FCD8"/>
                 </a:solidFill>
               </a:rPr>
-              <a:t>code </a:t>
-            </a:r>
+              <a:t>functions</a:t>
+            </a:r>
+          </a:p>
+          <a:p>
+            <a:pPr>
+              <a:lnSpc>
+                <a:spcPct val="100000"/>
+              </a:lnSpc>
+            </a:pPr>
             <a:r>
               <a:rPr lang="en-US" sz="2800" dirty="0" smtClean="0">
                 <a:solidFill>
                   <a:srgbClr val="F4FCD8"/>
                 </a:solidFill>
               </a:rPr>
-              <a:t>files</a:t>
-            </a:r>
-          </a:p>
-          <a:p>
-            <a:pPr>
-              <a:lnSpc>
-                <a:spcPct val="100000"/>
-              </a:lnSpc>
-            </a:pPr>
-            <a:r>
-              <a:rPr lang="en-US" sz="2800" dirty="0">
+              <a:t>Naming </a:t>
+            </a:r>
+            <a:r>
+              <a:rPr lang="en-US" sz="2800" dirty="0" err="1" smtClean="0">
                 <a:solidFill>
                   <a:srgbClr val="F4FCD8"/>
                 </a:solidFill>
               </a:rPr>
-              <a:t>Core </a:t>
+              <a:t>convensions</a:t>
             </a:r>
             <a:r>
               <a:rPr lang="en-US" sz="2800" dirty="0" smtClean="0">
@@ -10799,44 +10804,8 @@
                   <a:srgbClr val="F4FCD8"/>
                 </a:solidFill>
               </a:rPr>
-              <a:t>functions</a:t>
-            </a:r>
-          </a:p>
-          <a:p>
-            <a:pPr>
-              <a:lnSpc>
-                <a:spcPct val="100000"/>
-              </a:lnSpc>
-            </a:pPr>
-            <a:r>
-              <a:rPr lang="en-US" sz="2800" dirty="0" smtClean="0">
-                <a:solidFill>
-                  <a:srgbClr val="F4FCD8"/>
-                </a:solidFill>
-              </a:rPr>
-              <a:t>Naming </a:t>
-            </a:r>
-            <a:r>
-              <a:rPr lang="en-US" sz="2800" dirty="0" err="1" smtClean="0">
-                <a:solidFill>
-                  <a:srgbClr val="F4FCD8"/>
-                </a:solidFill>
-              </a:rPr>
-              <a:t>convensions</a:t>
-            </a:r>
-            <a:r>
-              <a:rPr lang="en-US" sz="2800" dirty="0" smtClean="0">
-                <a:solidFill>
-                  <a:srgbClr val="F4FCD8"/>
-                </a:solidFill>
-              </a:rPr>
               <a:t>(move to end!!!!)</a:t>
             </a:r>
-            <a:endParaRPr lang="en-US" sz="2800" dirty="0" smtClean="0">
-              <a:solidFill>
-                <a:srgbClr val="F4FCD8"/>
-              </a:solidFill>
-            </a:endParaRPr>
           </a:p>
         </p:txBody>
       </p:sp>
@@ -12250,11 +12219,7 @@
           <a:p>
             <a:r>
               <a:rPr lang="en-US" dirty="0" smtClean="0"/>
-              <a:t>Data </a:t>
-            </a:r>
-            <a:r>
-              <a:rPr lang="en-US" dirty="0" smtClean="0"/>
-              <a:t>structures</a:t>
+              <a:t>Data structures</a:t>
             </a:r>
             <a:endParaRPr lang="en-US" dirty="0"/>
           </a:p>
@@ -13008,11 +12973,7 @@
           <a:p>
             <a:r>
               <a:rPr lang="en-US" dirty="0" smtClean="0"/>
-              <a:t>Data </a:t>
-            </a:r>
-            <a:r>
-              <a:rPr lang="en-US" dirty="0" smtClean="0"/>
-              <a:t>structures(2)</a:t>
+              <a:t>Data structures(2)</a:t>
             </a:r>
             <a:endParaRPr lang="en-US" dirty="0"/>
           </a:p>
@@ -13051,11 +13012,6 @@
               </a:rPr>
               <a:t>Lists</a:t>
             </a:r>
-            <a:endParaRPr lang="en-US" dirty="0" smtClean="0">
-              <a:solidFill>
-                <a:srgbClr val="F4FCD8"/>
-              </a:solidFill>
-            </a:endParaRPr>
           </a:p>
           <a:p>
             <a:pPr lvl="1">
@@ -13071,11 +13027,6 @@
               </a:rPr>
               <a:t>Assign variables to array values</a:t>
             </a:r>
-            <a:endParaRPr lang="en-US" sz="2400" dirty="0" smtClean="0">
-              <a:solidFill>
-                <a:srgbClr val="F4FCD8"/>
-              </a:solidFill>
-            </a:endParaRPr>
           </a:p>
           <a:p>
             <a:pPr lvl="1">
@@ -13495,20 +13446,6 @@
               </a:rPr>
               <a:t>"$drink is $color and $power makes it special.\n";</a:t>
             </a:r>
-            <a:endParaRPr lang="en-US" sz="1600" b="1" noProof="1">
-              <a:solidFill>
-                <a:srgbClr val="8CF4F2"/>
-              </a:solidFill>
-              <a:effectLst>
-                <a:outerShdw blurRad="38100" dist="38100" dir="2700000" algn="tl">
-                  <a:srgbClr val="000000">
-                    <a:alpha val="43137"/>
-                  </a:srgbClr>
-                </a:outerShdw>
-              </a:effectLst>
-              <a:latin typeface="Consolas" pitchFamily="49" charset="0"/>
-              <a:cs typeface="Consolas" pitchFamily="49" charset="0"/>
-            </a:endParaRPr>
           </a:p>
         </p:txBody>
       </p:sp>
@@ -13918,20 +13855,6 @@
               </a:rPr>
               <a:t>echo get_resource_type($fp) . "\n";</a:t>
             </a:r>
-            <a:endParaRPr lang="en-US" sz="1600" b="1" noProof="1">
-              <a:solidFill>
-                <a:srgbClr val="8CF4F2"/>
-              </a:solidFill>
-              <a:effectLst>
-                <a:outerShdw blurRad="38100" dist="38100" dir="2700000" algn="tl">
-                  <a:srgbClr val="000000">
-                    <a:alpha val="43137"/>
-                  </a:srgbClr>
-                </a:outerShdw>
-              </a:effectLst>
-              <a:latin typeface="Consolas" pitchFamily="49" charset="0"/>
-              <a:cs typeface="Consolas" pitchFamily="49" charset="0"/>
-            </a:endParaRPr>
           </a:p>
         </p:txBody>
       </p:sp>
@@ -14186,24 +14109,7 @@
                 <a:latin typeface="Consolas" pitchFamily="49" charset="0"/>
                 <a:cs typeface="Consolas" pitchFamily="49" charset="0"/>
               </a:rPr>
-              <a:t>$ivan="</a:t>
-            </a:r>
-            <a:r>
-              <a:rPr lang="en-US" sz="1600" b="1" noProof="1">
-                <a:solidFill>
-                  <a:srgbClr val="8CF4F2"/>
-                </a:solidFill>
-                <a:effectLst>
-                  <a:outerShdw blurRad="38100" dist="38100" dir="2700000" algn="tl">
-                    <a:srgbClr val="000000">
-                      <a:alpha val="43137"/>
-                    </a:srgbClr>
-                  </a:outerShdw>
-                </a:effectLst>
-                <a:latin typeface="Consolas" pitchFamily="49" charset="0"/>
-                <a:cs typeface="Consolas" pitchFamily="49" charset="0"/>
-              </a:rPr>
-              <a:t>Ivan</a:t>
+              <a:t>$ivan="Ivan</a:t>
             </a:r>
             <a:r>
               <a:rPr lang="en-US" sz="1600" b="1" noProof="1" smtClean="0">
@@ -14268,24 +14174,7 @@
                 <a:latin typeface="Consolas" pitchFamily="49" charset="0"/>
                 <a:cs typeface="Consolas" pitchFamily="49" charset="0"/>
               </a:rPr>
-              <a:t>$maria</a:t>
-            </a:r>
-            <a:r>
-              <a:rPr lang="en-US" sz="1600" b="1" noProof="1">
-                <a:solidFill>
-                  <a:srgbClr val="8CF4F2"/>
-                </a:solidFill>
-                <a:effectLst>
-                  <a:outerShdw blurRad="38100" dist="38100" dir="2700000" algn="tl">
-                    <a:srgbClr val="000000">
-                      <a:alpha val="43137"/>
-                    </a:srgbClr>
-                  </a:outerShdw>
-                </a:effectLst>
-                <a:latin typeface="Consolas" pitchFamily="49" charset="0"/>
-                <a:cs typeface="Consolas" pitchFamily="49" charset="0"/>
-              </a:rPr>
-              <a:t>=</a:t>
+              <a:t>$maria=</a:t>
             </a:r>
             <a:r>
               <a:rPr lang="en-US" sz="1600" b="1" noProof="1" smtClean="0">
@@ -14593,10 +14482,10 @@
                 <a:latin typeface="Consolas" pitchFamily="49" charset="0"/>
                 <a:cs typeface="Consolas" pitchFamily="49" charset="0"/>
               </a:rPr>
-              <a:t>$conditionB</a:t>
-            </a:r>
-            <a:r>
-              <a:rPr lang="en-US" sz="1600" b="1" noProof="1">
+              <a:t>$conditionB) </a:t>
+            </a:r>
+            <a:r>
+              <a:rPr lang="en-US" sz="1600" b="1" noProof="1" smtClean="0">
                 <a:solidFill>
                   <a:srgbClr val="8CF4F2"/>
                 </a:solidFill>
@@ -14610,10 +14499,10 @@
                 <a:latin typeface="Consolas" pitchFamily="49" charset="0"/>
                 <a:cs typeface="Consolas" pitchFamily="49" charset="0"/>
               </a:rPr>
-              <a:t>) </a:t>
-            </a:r>
-            <a:r>
-              <a:rPr lang="en-US" sz="1600" b="1" noProof="1" smtClean="0">
+              <a:t>|| </a:t>
+            </a:r>
+            <a:r>
+              <a:rPr lang="en-US" sz="1600" b="1" noProof="1">
                 <a:solidFill>
                   <a:srgbClr val="8CF4F2"/>
                 </a:solidFill>
@@ -14627,41 +14516,7 @@
                 <a:latin typeface="Consolas" pitchFamily="49" charset="0"/>
                 <a:cs typeface="Consolas" pitchFamily="49" charset="0"/>
               </a:rPr>
-              <a:t>|| </a:t>
-            </a:r>
-            <a:r>
-              <a:rPr lang="en-US" sz="1600" b="1" noProof="1">
-                <a:solidFill>
-                  <a:srgbClr val="8CF4F2"/>
-                </a:solidFill>
-                <a:effectLst>
-                  <a:outerShdw blurRad="38100" dist="38100" dir="2700000" algn="tl">
-                    <a:srgbClr val="000000">
-                      <a:alpha val="43137"/>
-                    </a:srgbClr>
-                  </a:outerShdw>
-                </a:effectLst>
-                <a:latin typeface="Consolas" pitchFamily="49" charset="0"/>
-                <a:cs typeface="Consolas" pitchFamily="49" charset="0"/>
-              </a:rPr>
-              <a:t>(!$conditionA OR $</a:t>
-            </a:r>
-            <a:r>
-              <a:rPr lang="en-US" sz="1600" b="1" noProof="1">
-                <a:solidFill>
-                  <a:srgbClr val="8CF4F2"/>
-                </a:solidFill>
-                <a:effectLst>
-                  <a:outerShdw blurRad="38100" dist="38100" dir="2700000" algn="tl">
-                    <a:srgbClr val="000000">
-                      <a:alpha val="43137"/>
-                    </a:srgbClr>
-                  </a:outerShdw>
-                </a:effectLst>
-                <a:latin typeface="Consolas" pitchFamily="49" charset="0"/>
-                <a:cs typeface="Consolas" pitchFamily="49" charset="0"/>
-              </a:rPr>
-              <a:t>conditionB</a:t>
+              <a:t>(!$conditionA OR $conditionB</a:t>
             </a:r>
             <a:r>
               <a:rPr lang="en-US" sz="1600" b="1" noProof="1" smtClean="0">
@@ -15226,20 +15081,6 @@
               </a:rPr>
               <a:t>var_dump($x !== $y);</a:t>
             </a:r>
-            <a:endParaRPr lang="en-US" sz="1600" b="1" noProof="1">
-              <a:solidFill>
-                <a:srgbClr val="8CF4F2"/>
-              </a:solidFill>
-              <a:effectLst>
-                <a:outerShdw blurRad="38100" dist="38100" dir="2700000" algn="tl">
-                  <a:srgbClr val="000000">
-                    <a:alpha val="43137"/>
-                  </a:srgbClr>
-                </a:outerShdw>
-              </a:effectLst>
-              <a:latin typeface="Consolas" pitchFamily="49" charset="0"/>
-              <a:cs typeface="Consolas" pitchFamily="49" charset="0"/>
-            </a:endParaRPr>
           </a:p>
         </p:txBody>
       </p:sp>
@@ -16172,20 +16013,6 @@
               </a:rPr>
               <a:t>}</a:t>
             </a:r>
-            <a:endParaRPr lang="en-US" sz="1600" b="1" noProof="1">
-              <a:solidFill>
-                <a:srgbClr val="8CF4F2"/>
-              </a:solidFill>
-              <a:effectLst>
-                <a:outerShdw blurRad="38100" dist="38100" dir="2700000" algn="tl">
-                  <a:srgbClr val="000000">
-                    <a:alpha val="43137"/>
-                  </a:srgbClr>
-                </a:outerShdw>
-              </a:effectLst>
-              <a:latin typeface="Consolas" pitchFamily="49" charset="0"/>
-              <a:cs typeface="Consolas" pitchFamily="49" charset="0"/>
-            </a:endParaRPr>
           </a:p>
         </p:txBody>
       </p:sp>

</xml_diff>

<commit_message>
More progress made on the presentation
</commit_message>
<xml_diff>
--- a/PHP_MVC.pptx
+++ b/PHP_MVC.pptx
@@ -5,10 +5,10 @@
     <p:sldMasterId id="2147483672" r:id="rId1"/>
   </p:sldMasterIdLst>
   <p:notesMasterIdLst>
-    <p:notesMasterId r:id="rId33"/>
+    <p:notesMasterId r:id="rId37"/>
   </p:notesMasterIdLst>
   <p:handoutMasterIdLst>
-    <p:handoutMasterId r:id="rId34"/>
+    <p:handoutMasterId r:id="rId38"/>
   </p:handoutMasterIdLst>
   <p:sldIdLst>
     <p:sldId id="382" r:id="rId2"/>
@@ -42,6 +42,10 @@
     <p:sldId id="436" r:id="rId30"/>
     <p:sldId id="437" r:id="rId31"/>
     <p:sldId id="438" r:id="rId32"/>
+    <p:sldId id="441" r:id="rId33"/>
+    <p:sldId id="442" r:id="rId34"/>
+    <p:sldId id="439" r:id="rId35"/>
+    <p:sldId id="440" r:id="rId36"/>
   </p:sldIdLst>
   <p:sldSz cx="9144000" cy="6858000" type="screen4x3"/>
   <p:notesSz cx="6881813" cy="9296400"/>
@@ -172,7 +176,7 @@
   </p:defaultTextStyle>
   <p:extLst>
     <p:ext uri="{EFAFB233-063F-42B5-8137-9DF3F51BA10A}">
-      <p15:sldGuideLst xmlns:p15="http://schemas.microsoft.com/office/powerpoint/2012/main" xmlns="">
+      <p15:sldGuideLst xmlns="" xmlns:p15="http://schemas.microsoft.com/office/powerpoint/2012/main">
         <p15:guide id="1" orient="horz" pos="2160">
           <p15:clr>
             <a:srgbClr val="A4A3A4"/>
@@ -186,7 +190,7 @@
       </p15:sldGuideLst>
     </p:ext>
     <p:ext uri="{2D200454-40CA-4A62-9FC3-DE9A4176ACB9}">
-      <p15:notesGuideLst xmlns:p15="http://schemas.microsoft.com/office/powerpoint/2012/main" xmlns="">
+      <p15:notesGuideLst xmlns="" xmlns:p15="http://schemas.microsoft.com/office/powerpoint/2012/main">
         <p15:guide id="1" orient="horz" pos="2928">
           <p15:clr>
             <a:srgbClr val="A4A3A4"/>
@@ -318,7 +322,7 @@
             <a:fld id="{3BF7C7B5-275F-4D1F-9AB4-9255447DBC73}" type="datetimeFigureOut">
               <a:rPr lang="en-US"/>
               <a:pPr/>
-              <a:t>11/4/2014</a:t>
+              <a:t>11/10/2014</a:t>
             </a:fld>
             <a:endParaRPr lang="en-US" dirty="0"/>
           </a:p>
@@ -549,7 +553,7 @@
             <a:fld id="{9B46F231-FB2B-4655-A644-E2477325E686}" type="datetimeFigureOut">
               <a:rPr lang="en-US"/>
               <a:pPr/>
-              <a:t>11/4/2014</a:t>
+              <a:t>11/10/2014</a:t>
             </a:fld>
             <a:endParaRPr lang="en-US" dirty="0"/>
           </a:p>
@@ -1180,7 +1184,7 @@
                 </a:solidFill>
               </a:rPr>
               <a:pPr/>
-              <a:t>11/4/2014</a:t>
+              <a:t>11/10/2014</a:t>
             </a:fld>
             <a:r>
               <a:rPr lang="en-US" sz="1100" b="0" dirty="0">
@@ -1822,7 +1826,7 @@
                 </a:solidFill>
               </a:rPr>
               <a:pPr/>
-              <a:t>11/4/2014</a:t>
+              <a:t>11/10/2014</a:t>
             </a:fld>
             <a:r>
               <a:rPr lang="en-US" sz="1100" b="0" dirty="0">
@@ -2464,7 +2468,7 @@
                 </a:solidFill>
               </a:rPr>
               <a:pPr/>
-              <a:t>11/4/2014</a:t>
+              <a:t>11/10/2014</a:t>
             </a:fld>
             <a:r>
               <a:rPr lang="en-US" sz="1100" b="0" dirty="0">
@@ -3106,7 +3110,7 @@
                 </a:solidFill>
               </a:rPr>
               <a:pPr/>
-              <a:t>11/4/2014</a:t>
+              <a:t>11/10/2014</a:t>
             </a:fld>
             <a:r>
               <a:rPr lang="en-US" sz="1100" b="0" dirty="0">
@@ -3527,6 +3531,818 @@
               <a:rPr lang="en-US" smtClean="0"/>
               <a:pPr/>
               <a:t>31</a:t>
+            </a:fld>
+            <a:endParaRPr lang="en-US" dirty="0"/>
+          </a:p>
+        </p:txBody>
+      </p:sp>
+    </p:spTree>
+    <p:extLst>
+      <p:ext uri="{BB962C8B-B14F-4D97-AF65-F5344CB8AC3E}">
+        <p14:creationId xmlns:p14="http://schemas.microsoft.com/office/powerpoint/2010/main" val="2968209395"/>
+      </p:ext>
+    </p:extLst>
+  </p:cSld>
+  <p:clrMapOvr>
+    <a:masterClrMapping/>
+  </p:clrMapOvr>
+</p:notes>
+</file>
+
+<file path=ppt/notesSlides/notesSlide6.xml><?xml version="1.0" encoding="utf-8"?>
+<p:notes xmlns:a="http://schemas.openxmlformats.org/drawingml/2006/main" xmlns:r="http://schemas.openxmlformats.org/officeDocument/2006/relationships" xmlns:p="http://schemas.openxmlformats.org/presentationml/2006/main">
+  <p:cSld>
+    <p:spTree>
+      <p:nvGrpSpPr>
+        <p:cNvPr id="1" name=""/>
+        <p:cNvGrpSpPr/>
+        <p:nvPr/>
+      </p:nvGrpSpPr>
+      <p:grpSpPr>
+        <a:xfrm>
+          <a:off x="0" y="0"/>
+          <a:ext cx="0" cy="0"/>
+          <a:chOff x="0" y="0"/>
+          <a:chExt cx="0" cy="0"/>
+        </a:xfrm>
+      </p:grpSpPr>
+      <p:sp>
+        <p:nvSpPr>
+          <p:cNvPr id="50178" name="Rectangle 2"/>
+          <p:cNvSpPr>
+            <a:spLocks noGrp="1" noChangeArrowheads="1"/>
+          </p:cNvSpPr>
+          <p:nvPr>
+            <p:ph type="hdr" sz="quarter"/>
+          </p:nvPr>
+        </p:nvSpPr>
+        <p:spPr/>
+        <p:txBody>
+          <a:bodyPr/>
+          <a:lstStyle>
+            <a:lvl1pPr defTabSz="990600">
+              <a:defRPr kumimoji="1" sz="4000" b="1">
+                <a:solidFill>
+                  <a:srgbClr val="000000"/>
+                </a:solidFill>
+                <a:latin typeface="Arial" charset="0"/>
+              </a:defRPr>
+            </a:lvl1pPr>
+            <a:lvl2pPr marL="776288" indent="-298450" defTabSz="990600">
+              <a:defRPr kumimoji="1" sz="4000" b="1">
+                <a:solidFill>
+                  <a:srgbClr val="000000"/>
+                </a:solidFill>
+                <a:latin typeface="Arial" charset="0"/>
+              </a:defRPr>
+            </a:lvl2pPr>
+            <a:lvl3pPr marL="1193800" indent="-238125" defTabSz="990600">
+              <a:defRPr kumimoji="1" sz="4000" b="1">
+                <a:solidFill>
+                  <a:srgbClr val="000000"/>
+                </a:solidFill>
+                <a:latin typeface="Arial" charset="0"/>
+              </a:defRPr>
+            </a:lvl3pPr>
+            <a:lvl4pPr marL="1671638" indent="-239713" defTabSz="990600">
+              <a:defRPr kumimoji="1" sz="4000" b="1">
+                <a:solidFill>
+                  <a:srgbClr val="000000"/>
+                </a:solidFill>
+                <a:latin typeface="Arial" charset="0"/>
+              </a:defRPr>
+            </a:lvl4pPr>
+            <a:lvl5pPr marL="2149475" indent="-239713" defTabSz="990600">
+              <a:defRPr kumimoji="1" sz="4000" b="1">
+                <a:solidFill>
+                  <a:srgbClr val="000000"/>
+                </a:solidFill>
+                <a:latin typeface="Arial" charset="0"/>
+              </a:defRPr>
+            </a:lvl5pPr>
+            <a:lvl6pPr marL="2606675" indent="-239713" defTabSz="990600" eaLnBrk="0" fontAlgn="base" hangingPunct="0">
+              <a:lnSpc>
+                <a:spcPct val="85000"/>
+              </a:lnSpc>
+              <a:spcBef>
+                <a:spcPct val="0"/>
+              </a:spcBef>
+              <a:spcAft>
+                <a:spcPct val="0"/>
+              </a:spcAft>
+              <a:defRPr kumimoji="1" sz="4000" b="1">
+                <a:solidFill>
+                  <a:srgbClr val="000000"/>
+                </a:solidFill>
+                <a:latin typeface="Arial" charset="0"/>
+              </a:defRPr>
+            </a:lvl6pPr>
+            <a:lvl7pPr marL="3063875" indent="-239713" defTabSz="990600" eaLnBrk="0" fontAlgn="base" hangingPunct="0">
+              <a:lnSpc>
+                <a:spcPct val="85000"/>
+              </a:lnSpc>
+              <a:spcBef>
+                <a:spcPct val="0"/>
+              </a:spcBef>
+              <a:spcAft>
+                <a:spcPct val="0"/>
+              </a:spcAft>
+              <a:defRPr kumimoji="1" sz="4000" b="1">
+                <a:solidFill>
+                  <a:srgbClr val="000000"/>
+                </a:solidFill>
+                <a:latin typeface="Arial" charset="0"/>
+              </a:defRPr>
+            </a:lvl7pPr>
+            <a:lvl8pPr marL="3521075" indent="-239713" defTabSz="990600" eaLnBrk="0" fontAlgn="base" hangingPunct="0">
+              <a:lnSpc>
+                <a:spcPct val="85000"/>
+              </a:lnSpc>
+              <a:spcBef>
+                <a:spcPct val="0"/>
+              </a:spcBef>
+              <a:spcAft>
+                <a:spcPct val="0"/>
+              </a:spcAft>
+              <a:defRPr kumimoji="1" sz="4000" b="1">
+                <a:solidFill>
+                  <a:srgbClr val="000000"/>
+                </a:solidFill>
+                <a:latin typeface="Arial" charset="0"/>
+              </a:defRPr>
+            </a:lvl8pPr>
+            <a:lvl9pPr marL="3978275" indent="-239713" defTabSz="990600" eaLnBrk="0" fontAlgn="base" hangingPunct="0">
+              <a:lnSpc>
+                <a:spcPct val="85000"/>
+              </a:lnSpc>
+              <a:spcBef>
+                <a:spcPct val="0"/>
+              </a:spcBef>
+              <a:spcAft>
+                <a:spcPct val="0"/>
+              </a:spcAft>
+              <a:defRPr kumimoji="1" sz="4000" b="1">
+                <a:solidFill>
+                  <a:srgbClr val="000000"/>
+                </a:solidFill>
+                <a:latin typeface="Arial" charset="0"/>
+              </a:defRPr>
+            </a:lvl9pPr>
+          </a:lstStyle>
+          <a:p>
+            <a:r>
+              <a:rPr lang="en-US" sz="1100" b="0" dirty="0">
+                <a:solidFill>
+                  <a:schemeClr val="tx1"/>
+                </a:solidFill>
+              </a:rPr>
+              <a:t>*</a:t>
+            </a:r>
+            <a:endParaRPr lang="en-US" sz="1300" b="0" i="0" dirty="0">
+              <a:solidFill>
+                <a:schemeClr val="tx1"/>
+              </a:solidFill>
+            </a:endParaRPr>
+          </a:p>
+        </p:txBody>
+      </p:sp>
+      <p:sp>
+        <p:nvSpPr>
+          <p:cNvPr id="50179" name="Rectangle 3"/>
+          <p:cNvSpPr>
+            <a:spLocks noGrp="1" noChangeArrowheads="1"/>
+          </p:cNvSpPr>
+          <p:nvPr>
+            <p:ph type="dt" sz="quarter" idx="1"/>
+          </p:nvPr>
+        </p:nvSpPr>
+        <p:spPr/>
+        <p:txBody>
+          <a:bodyPr/>
+          <a:lstStyle>
+            <a:lvl1pPr defTabSz="990600">
+              <a:defRPr kumimoji="1" sz="4000" b="1">
+                <a:solidFill>
+                  <a:srgbClr val="000000"/>
+                </a:solidFill>
+                <a:latin typeface="Arial" charset="0"/>
+              </a:defRPr>
+            </a:lvl1pPr>
+            <a:lvl2pPr marL="776288" indent="-298450" defTabSz="990600">
+              <a:defRPr kumimoji="1" sz="4000" b="1">
+                <a:solidFill>
+                  <a:srgbClr val="000000"/>
+                </a:solidFill>
+                <a:latin typeface="Arial" charset="0"/>
+              </a:defRPr>
+            </a:lvl2pPr>
+            <a:lvl3pPr marL="1193800" indent="-238125" defTabSz="990600">
+              <a:defRPr kumimoji="1" sz="4000" b="1">
+                <a:solidFill>
+                  <a:srgbClr val="000000"/>
+                </a:solidFill>
+                <a:latin typeface="Arial" charset="0"/>
+              </a:defRPr>
+            </a:lvl3pPr>
+            <a:lvl4pPr marL="1671638" indent="-239713" defTabSz="990600">
+              <a:defRPr kumimoji="1" sz="4000" b="1">
+                <a:solidFill>
+                  <a:srgbClr val="000000"/>
+                </a:solidFill>
+                <a:latin typeface="Arial" charset="0"/>
+              </a:defRPr>
+            </a:lvl4pPr>
+            <a:lvl5pPr marL="2149475" indent="-239713" defTabSz="990600">
+              <a:defRPr kumimoji="1" sz="4000" b="1">
+                <a:solidFill>
+                  <a:srgbClr val="000000"/>
+                </a:solidFill>
+                <a:latin typeface="Arial" charset="0"/>
+              </a:defRPr>
+            </a:lvl5pPr>
+            <a:lvl6pPr marL="2606675" indent="-239713" defTabSz="990600" eaLnBrk="0" fontAlgn="base" hangingPunct="0">
+              <a:lnSpc>
+                <a:spcPct val="85000"/>
+              </a:lnSpc>
+              <a:spcBef>
+                <a:spcPct val="0"/>
+              </a:spcBef>
+              <a:spcAft>
+                <a:spcPct val="0"/>
+              </a:spcAft>
+              <a:defRPr kumimoji="1" sz="4000" b="1">
+                <a:solidFill>
+                  <a:srgbClr val="000000"/>
+                </a:solidFill>
+                <a:latin typeface="Arial" charset="0"/>
+              </a:defRPr>
+            </a:lvl6pPr>
+            <a:lvl7pPr marL="3063875" indent="-239713" defTabSz="990600" eaLnBrk="0" fontAlgn="base" hangingPunct="0">
+              <a:lnSpc>
+                <a:spcPct val="85000"/>
+              </a:lnSpc>
+              <a:spcBef>
+                <a:spcPct val="0"/>
+              </a:spcBef>
+              <a:spcAft>
+                <a:spcPct val="0"/>
+              </a:spcAft>
+              <a:defRPr kumimoji="1" sz="4000" b="1">
+                <a:solidFill>
+                  <a:srgbClr val="000000"/>
+                </a:solidFill>
+                <a:latin typeface="Arial" charset="0"/>
+              </a:defRPr>
+            </a:lvl7pPr>
+            <a:lvl8pPr marL="3521075" indent="-239713" defTabSz="990600" eaLnBrk="0" fontAlgn="base" hangingPunct="0">
+              <a:lnSpc>
+                <a:spcPct val="85000"/>
+              </a:lnSpc>
+              <a:spcBef>
+                <a:spcPct val="0"/>
+              </a:spcBef>
+              <a:spcAft>
+                <a:spcPct val="0"/>
+              </a:spcAft>
+              <a:defRPr kumimoji="1" sz="4000" b="1">
+                <a:solidFill>
+                  <a:srgbClr val="000000"/>
+                </a:solidFill>
+                <a:latin typeface="Arial" charset="0"/>
+              </a:defRPr>
+            </a:lvl8pPr>
+            <a:lvl9pPr marL="3978275" indent="-239713" defTabSz="990600" eaLnBrk="0" fontAlgn="base" hangingPunct="0">
+              <a:lnSpc>
+                <a:spcPct val="85000"/>
+              </a:lnSpc>
+              <a:spcBef>
+                <a:spcPct val="0"/>
+              </a:spcBef>
+              <a:spcAft>
+                <a:spcPct val="0"/>
+              </a:spcAft>
+              <a:defRPr kumimoji="1" sz="4000" b="1">
+                <a:solidFill>
+                  <a:srgbClr val="000000"/>
+                </a:solidFill>
+                <a:latin typeface="Arial" charset="0"/>
+              </a:defRPr>
+            </a:lvl9pPr>
+          </a:lstStyle>
+          <a:p>
+            <a:fld id="{33BD271E-2113-4C30-9CBB-D88489DF8451}" type="datetime1">
+              <a:rPr lang="en-US" sz="1100" b="0">
+                <a:solidFill>
+                  <a:schemeClr val="tx1"/>
+                </a:solidFill>
+              </a:rPr>
+              <a:pPr/>
+              <a:t>11/10/2014</a:t>
+            </a:fld>
+            <a:r>
+              <a:rPr lang="en-US" sz="1100" b="0" dirty="0">
+                <a:solidFill>
+                  <a:schemeClr val="tx1"/>
+                </a:solidFill>
+              </a:rPr>
+              <a:t>07/16/96</a:t>
+            </a:r>
+            <a:endParaRPr lang="en-US" sz="1300" b="0" i="0" dirty="0">
+              <a:solidFill>
+                <a:schemeClr val="tx1"/>
+              </a:solidFill>
+            </a:endParaRPr>
+          </a:p>
+        </p:txBody>
+      </p:sp>
+      <p:sp>
+        <p:nvSpPr>
+          <p:cNvPr id="50180" name="Rectangle 6"/>
+          <p:cNvSpPr>
+            <a:spLocks noGrp="1" noChangeArrowheads="1"/>
+          </p:cNvSpPr>
+          <p:nvPr>
+            <p:ph type="ftr" sz="quarter" idx="4"/>
+          </p:nvPr>
+        </p:nvSpPr>
+        <p:spPr/>
+        <p:txBody>
+          <a:bodyPr/>
+          <a:lstStyle>
+            <a:lvl1pPr defTabSz="990600">
+              <a:defRPr kumimoji="1" sz="4000" b="1">
+                <a:solidFill>
+                  <a:srgbClr val="000000"/>
+                </a:solidFill>
+                <a:latin typeface="Arial" charset="0"/>
+              </a:defRPr>
+            </a:lvl1pPr>
+            <a:lvl2pPr marL="776288" indent="-298450" defTabSz="990600">
+              <a:defRPr kumimoji="1" sz="4000" b="1">
+                <a:solidFill>
+                  <a:srgbClr val="000000"/>
+                </a:solidFill>
+                <a:latin typeface="Arial" charset="0"/>
+              </a:defRPr>
+            </a:lvl2pPr>
+            <a:lvl3pPr marL="1193800" indent="-238125" defTabSz="990600">
+              <a:defRPr kumimoji="1" sz="4000" b="1">
+                <a:solidFill>
+                  <a:srgbClr val="000000"/>
+                </a:solidFill>
+                <a:latin typeface="Arial" charset="0"/>
+              </a:defRPr>
+            </a:lvl3pPr>
+            <a:lvl4pPr marL="1671638" indent="-239713" defTabSz="990600">
+              <a:defRPr kumimoji="1" sz="4000" b="1">
+                <a:solidFill>
+                  <a:srgbClr val="000000"/>
+                </a:solidFill>
+                <a:latin typeface="Arial" charset="0"/>
+              </a:defRPr>
+            </a:lvl4pPr>
+            <a:lvl5pPr marL="2149475" indent="-239713" defTabSz="990600">
+              <a:defRPr kumimoji="1" sz="4000" b="1">
+                <a:solidFill>
+                  <a:srgbClr val="000000"/>
+                </a:solidFill>
+                <a:latin typeface="Arial" charset="0"/>
+              </a:defRPr>
+            </a:lvl5pPr>
+            <a:lvl6pPr marL="2606675" indent="-239713" defTabSz="990600" eaLnBrk="0" fontAlgn="base" hangingPunct="0">
+              <a:lnSpc>
+                <a:spcPct val="85000"/>
+              </a:lnSpc>
+              <a:spcBef>
+                <a:spcPct val="0"/>
+              </a:spcBef>
+              <a:spcAft>
+                <a:spcPct val="0"/>
+              </a:spcAft>
+              <a:defRPr kumimoji="1" sz="4000" b="1">
+                <a:solidFill>
+                  <a:srgbClr val="000000"/>
+                </a:solidFill>
+                <a:latin typeface="Arial" charset="0"/>
+              </a:defRPr>
+            </a:lvl6pPr>
+            <a:lvl7pPr marL="3063875" indent="-239713" defTabSz="990600" eaLnBrk="0" fontAlgn="base" hangingPunct="0">
+              <a:lnSpc>
+                <a:spcPct val="85000"/>
+              </a:lnSpc>
+              <a:spcBef>
+                <a:spcPct val="0"/>
+              </a:spcBef>
+              <a:spcAft>
+                <a:spcPct val="0"/>
+              </a:spcAft>
+              <a:defRPr kumimoji="1" sz="4000" b="1">
+                <a:solidFill>
+                  <a:srgbClr val="000000"/>
+                </a:solidFill>
+                <a:latin typeface="Arial" charset="0"/>
+              </a:defRPr>
+            </a:lvl7pPr>
+            <a:lvl8pPr marL="3521075" indent="-239713" defTabSz="990600" eaLnBrk="0" fontAlgn="base" hangingPunct="0">
+              <a:lnSpc>
+                <a:spcPct val="85000"/>
+              </a:lnSpc>
+              <a:spcBef>
+                <a:spcPct val="0"/>
+              </a:spcBef>
+              <a:spcAft>
+                <a:spcPct val="0"/>
+              </a:spcAft>
+              <a:defRPr kumimoji="1" sz="4000" b="1">
+                <a:solidFill>
+                  <a:srgbClr val="000000"/>
+                </a:solidFill>
+                <a:latin typeface="Arial" charset="0"/>
+              </a:defRPr>
+            </a:lvl8pPr>
+            <a:lvl9pPr marL="3978275" indent="-239713" defTabSz="990600" eaLnBrk="0" fontAlgn="base" hangingPunct="0">
+              <a:lnSpc>
+                <a:spcPct val="85000"/>
+              </a:lnSpc>
+              <a:spcBef>
+                <a:spcPct val="0"/>
+              </a:spcBef>
+              <a:spcAft>
+                <a:spcPct val="0"/>
+              </a:spcAft>
+              <a:defRPr kumimoji="1" sz="4000" b="1">
+                <a:solidFill>
+                  <a:srgbClr val="000000"/>
+                </a:solidFill>
+                <a:latin typeface="Arial" charset="0"/>
+              </a:defRPr>
+            </a:lvl9pPr>
+          </a:lstStyle>
+          <a:p>
+            <a:r>
+              <a:rPr lang="en-US" sz="1100" b="0" dirty="0">
+                <a:solidFill>
+                  <a:schemeClr val="tx1"/>
+                </a:solidFill>
+              </a:rPr>
+              <a:t>(c) 2005 National Academy for Software Development - http://academy.devbg.org. All rights reserved. Unauthorized copying or re-distribution is strictly prohibited.*</a:t>
+            </a:r>
+            <a:endParaRPr lang="en-US" sz="1300" b="0" i="0" dirty="0">
+              <a:solidFill>
+                <a:schemeClr val="tx1"/>
+              </a:solidFill>
+            </a:endParaRPr>
+          </a:p>
+        </p:txBody>
+      </p:sp>
+      <p:sp>
+        <p:nvSpPr>
+          <p:cNvPr id="50181" name="Rectangle 7"/>
+          <p:cNvSpPr>
+            <a:spLocks noGrp="1" noChangeArrowheads="1"/>
+          </p:cNvSpPr>
+          <p:nvPr>
+            <p:ph type="sldNum" sz="quarter" idx="5"/>
+          </p:nvPr>
+        </p:nvSpPr>
+        <p:spPr/>
+        <p:txBody>
+          <a:bodyPr/>
+          <a:lstStyle>
+            <a:lvl1pPr defTabSz="990600">
+              <a:defRPr kumimoji="1" sz="4000" b="1">
+                <a:solidFill>
+                  <a:srgbClr val="000000"/>
+                </a:solidFill>
+                <a:latin typeface="Arial" charset="0"/>
+              </a:defRPr>
+            </a:lvl1pPr>
+            <a:lvl2pPr marL="776288" indent="-298450" defTabSz="990600">
+              <a:defRPr kumimoji="1" sz="4000" b="1">
+                <a:solidFill>
+                  <a:srgbClr val="000000"/>
+                </a:solidFill>
+                <a:latin typeface="Arial" charset="0"/>
+              </a:defRPr>
+            </a:lvl2pPr>
+            <a:lvl3pPr marL="1193800" indent="-238125" defTabSz="990600">
+              <a:defRPr kumimoji="1" sz="4000" b="1">
+                <a:solidFill>
+                  <a:srgbClr val="000000"/>
+                </a:solidFill>
+                <a:latin typeface="Arial" charset="0"/>
+              </a:defRPr>
+            </a:lvl3pPr>
+            <a:lvl4pPr marL="1671638" indent="-239713" defTabSz="990600">
+              <a:defRPr kumimoji="1" sz="4000" b="1">
+                <a:solidFill>
+                  <a:srgbClr val="000000"/>
+                </a:solidFill>
+                <a:latin typeface="Arial" charset="0"/>
+              </a:defRPr>
+            </a:lvl4pPr>
+            <a:lvl5pPr marL="2149475" indent="-239713" defTabSz="990600">
+              <a:defRPr kumimoji="1" sz="4000" b="1">
+                <a:solidFill>
+                  <a:srgbClr val="000000"/>
+                </a:solidFill>
+                <a:latin typeface="Arial" charset="0"/>
+              </a:defRPr>
+            </a:lvl5pPr>
+            <a:lvl6pPr marL="2606675" indent="-239713" defTabSz="990600" eaLnBrk="0" fontAlgn="base" hangingPunct="0">
+              <a:lnSpc>
+                <a:spcPct val="85000"/>
+              </a:lnSpc>
+              <a:spcBef>
+                <a:spcPct val="0"/>
+              </a:spcBef>
+              <a:spcAft>
+                <a:spcPct val="0"/>
+              </a:spcAft>
+              <a:defRPr kumimoji="1" sz="4000" b="1">
+                <a:solidFill>
+                  <a:srgbClr val="000000"/>
+                </a:solidFill>
+                <a:latin typeface="Arial" charset="0"/>
+              </a:defRPr>
+            </a:lvl6pPr>
+            <a:lvl7pPr marL="3063875" indent="-239713" defTabSz="990600" eaLnBrk="0" fontAlgn="base" hangingPunct="0">
+              <a:lnSpc>
+                <a:spcPct val="85000"/>
+              </a:lnSpc>
+              <a:spcBef>
+                <a:spcPct val="0"/>
+              </a:spcBef>
+              <a:spcAft>
+                <a:spcPct val="0"/>
+              </a:spcAft>
+              <a:defRPr kumimoji="1" sz="4000" b="1">
+                <a:solidFill>
+                  <a:srgbClr val="000000"/>
+                </a:solidFill>
+                <a:latin typeface="Arial" charset="0"/>
+              </a:defRPr>
+            </a:lvl7pPr>
+            <a:lvl8pPr marL="3521075" indent="-239713" defTabSz="990600" eaLnBrk="0" fontAlgn="base" hangingPunct="0">
+              <a:lnSpc>
+                <a:spcPct val="85000"/>
+              </a:lnSpc>
+              <a:spcBef>
+                <a:spcPct val="0"/>
+              </a:spcBef>
+              <a:spcAft>
+                <a:spcPct val="0"/>
+              </a:spcAft>
+              <a:defRPr kumimoji="1" sz="4000" b="1">
+                <a:solidFill>
+                  <a:srgbClr val="000000"/>
+                </a:solidFill>
+                <a:latin typeface="Arial" charset="0"/>
+              </a:defRPr>
+            </a:lvl8pPr>
+            <a:lvl9pPr marL="3978275" indent="-239713" defTabSz="990600" eaLnBrk="0" fontAlgn="base" hangingPunct="0">
+              <a:lnSpc>
+                <a:spcPct val="85000"/>
+              </a:lnSpc>
+              <a:spcBef>
+                <a:spcPct val="0"/>
+              </a:spcBef>
+              <a:spcAft>
+                <a:spcPct val="0"/>
+              </a:spcAft>
+              <a:defRPr kumimoji="1" sz="4000" b="1">
+                <a:solidFill>
+                  <a:srgbClr val="000000"/>
+                </a:solidFill>
+                <a:latin typeface="Arial" charset="0"/>
+              </a:defRPr>
+            </a:lvl9pPr>
+          </a:lstStyle>
+          <a:p>
+            <a:fld id="{BE444996-B045-43EC-8E14-9E3A374FC3C1}" type="slidenum">
+              <a:rPr lang="en-US" sz="1100" b="0">
+                <a:solidFill>
+                  <a:schemeClr val="tx1"/>
+                </a:solidFill>
+              </a:rPr>
+              <a:pPr/>
+              <a:t>32</a:t>
+            </a:fld>
+            <a:r>
+              <a:rPr lang="en-US" sz="1100" b="0" dirty="0">
+                <a:solidFill>
+                  <a:schemeClr val="tx1"/>
+                </a:solidFill>
+              </a:rPr>
+              <a:t>##</a:t>
+            </a:r>
+            <a:endParaRPr lang="en-US" sz="1300" b="0" i="0" dirty="0">
+              <a:solidFill>
+                <a:schemeClr val="tx1"/>
+              </a:solidFill>
+            </a:endParaRPr>
+          </a:p>
+        </p:txBody>
+      </p:sp>
+      <p:sp>
+        <p:nvSpPr>
+          <p:cNvPr id="50182" name="Rectangle 2"/>
+          <p:cNvSpPr>
+            <a:spLocks noGrp="1" noRot="1" noChangeAspect="1" noChangeArrowheads="1" noTextEdit="1"/>
+          </p:cNvSpPr>
+          <p:nvPr>
+            <p:ph type="sldImg"/>
+          </p:nvPr>
+        </p:nvSpPr>
+        <p:spPr>
+          <a:ln/>
+        </p:spPr>
+      </p:sp>
+      <p:sp>
+        <p:nvSpPr>
+          <p:cNvPr id="50183" name="Rectangle 3"/>
+          <p:cNvSpPr>
+            <a:spLocks noGrp="1" noChangeArrowheads="1"/>
+          </p:cNvSpPr>
+          <p:nvPr>
+            <p:ph type="body" idx="1"/>
+          </p:nvPr>
+        </p:nvSpPr>
+        <p:spPr/>
+        <p:txBody>
+          <a:bodyPr/>
+          <a:lstStyle/>
+          <a:p>
+            <a:pPr eaLnBrk="1" hangingPunct="1"/>
+            <a:endParaRPr lang="bg-BG" smtClean="0"/>
+          </a:p>
+        </p:txBody>
+      </p:sp>
+    </p:spTree>
+    <p:extLst>
+      <p:ext uri="{BB962C8B-B14F-4D97-AF65-F5344CB8AC3E}">
+        <p14:creationId xmlns:p14="http://schemas.microsoft.com/office/powerpoint/2010/main" val="1309719148"/>
+      </p:ext>
+    </p:extLst>
+  </p:cSld>
+  <p:clrMapOvr>
+    <a:masterClrMapping/>
+  </p:clrMapOvr>
+</p:notes>
+</file>
+
+<file path=ppt/notesSlides/notesSlide7.xml><?xml version="1.0" encoding="utf-8"?>
+<p:notes xmlns:a="http://schemas.openxmlformats.org/drawingml/2006/main" xmlns:r="http://schemas.openxmlformats.org/officeDocument/2006/relationships" xmlns:p="http://schemas.openxmlformats.org/presentationml/2006/main">
+  <p:cSld>
+    <p:spTree>
+      <p:nvGrpSpPr>
+        <p:cNvPr id="1" name=""/>
+        <p:cNvGrpSpPr/>
+        <p:nvPr/>
+      </p:nvGrpSpPr>
+      <p:grpSpPr>
+        <a:xfrm>
+          <a:off x="0" y="0"/>
+          <a:ext cx="0" cy="0"/>
+          <a:chOff x="0" y="0"/>
+          <a:chExt cx="0" cy="0"/>
+        </a:xfrm>
+      </p:grpSpPr>
+      <p:sp>
+        <p:nvSpPr>
+          <p:cNvPr id="2" name="Контейнер за изображение на слайда 1"/>
+          <p:cNvSpPr>
+            <a:spLocks noGrp="1" noRot="1" noChangeAspect="1"/>
+          </p:cNvSpPr>
+          <p:nvPr>
+            <p:ph type="sldImg"/>
+          </p:nvPr>
+        </p:nvSpPr>
+        <p:spPr/>
+      </p:sp>
+      <p:sp>
+        <p:nvSpPr>
+          <p:cNvPr id="3" name="Контейнер за бележки 2"/>
+          <p:cNvSpPr>
+            <a:spLocks noGrp="1"/>
+          </p:cNvSpPr>
+          <p:nvPr>
+            <p:ph type="body" idx="1"/>
+          </p:nvPr>
+        </p:nvSpPr>
+        <p:spPr/>
+        <p:txBody>
+          <a:bodyPr/>
+          <a:lstStyle/>
+          <a:p>
+            <a:endParaRPr lang="bg-BG" dirty="0"/>
+          </a:p>
+        </p:txBody>
+      </p:sp>
+      <p:sp>
+        <p:nvSpPr>
+          <p:cNvPr id="4" name="Контейнер за номер на слайда 3"/>
+          <p:cNvSpPr>
+            <a:spLocks noGrp="1"/>
+          </p:cNvSpPr>
+          <p:nvPr>
+            <p:ph type="sldNum" sz="quarter" idx="10"/>
+          </p:nvPr>
+        </p:nvSpPr>
+        <p:spPr/>
+        <p:txBody>
+          <a:bodyPr/>
+          <a:lstStyle/>
+          <a:p>
+            <a:fld id="{6FB4F6EA-423E-42DF-9292-215E7D886C4E}" type="slidenum">
+              <a:rPr lang="en-US" smtClean="0"/>
+              <a:pPr/>
+              <a:t>34</a:t>
+            </a:fld>
+            <a:endParaRPr lang="en-US" dirty="0"/>
+          </a:p>
+        </p:txBody>
+      </p:sp>
+    </p:spTree>
+    <p:extLst>
+      <p:ext uri="{BB962C8B-B14F-4D97-AF65-F5344CB8AC3E}">
+        <p14:creationId xmlns:p14="http://schemas.microsoft.com/office/powerpoint/2010/main" val="2968209395"/>
+      </p:ext>
+    </p:extLst>
+  </p:cSld>
+  <p:clrMapOvr>
+    <a:masterClrMapping/>
+  </p:clrMapOvr>
+</p:notes>
+</file>
+
+<file path=ppt/notesSlides/notesSlide8.xml><?xml version="1.0" encoding="utf-8"?>
+<p:notes xmlns:a="http://schemas.openxmlformats.org/drawingml/2006/main" xmlns:r="http://schemas.openxmlformats.org/officeDocument/2006/relationships" xmlns:p="http://schemas.openxmlformats.org/presentationml/2006/main">
+  <p:cSld>
+    <p:spTree>
+      <p:nvGrpSpPr>
+        <p:cNvPr id="1" name=""/>
+        <p:cNvGrpSpPr/>
+        <p:nvPr/>
+      </p:nvGrpSpPr>
+      <p:grpSpPr>
+        <a:xfrm>
+          <a:off x="0" y="0"/>
+          <a:ext cx="0" cy="0"/>
+          <a:chOff x="0" y="0"/>
+          <a:chExt cx="0" cy="0"/>
+        </a:xfrm>
+      </p:grpSpPr>
+      <p:sp>
+        <p:nvSpPr>
+          <p:cNvPr id="2" name="Контейнер за изображение на слайда 1"/>
+          <p:cNvSpPr>
+            <a:spLocks noGrp="1" noRot="1" noChangeAspect="1"/>
+          </p:cNvSpPr>
+          <p:nvPr>
+            <p:ph type="sldImg"/>
+          </p:nvPr>
+        </p:nvSpPr>
+        <p:spPr/>
+      </p:sp>
+      <p:sp>
+        <p:nvSpPr>
+          <p:cNvPr id="3" name="Контейнер за бележки 2"/>
+          <p:cNvSpPr>
+            <a:spLocks noGrp="1"/>
+          </p:cNvSpPr>
+          <p:nvPr>
+            <p:ph type="body" idx="1"/>
+          </p:nvPr>
+        </p:nvSpPr>
+        <p:spPr/>
+        <p:txBody>
+          <a:bodyPr/>
+          <a:lstStyle/>
+          <a:p>
+            <a:endParaRPr lang="bg-BG" dirty="0"/>
+          </a:p>
+        </p:txBody>
+      </p:sp>
+      <p:sp>
+        <p:nvSpPr>
+          <p:cNvPr id="4" name="Контейнер за номер на слайда 3"/>
+          <p:cNvSpPr>
+            <a:spLocks noGrp="1"/>
+          </p:cNvSpPr>
+          <p:nvPr>
+            <p:ph type="sldNum" sz="quarter" idx="10"/>
+          </p:nvPr>
+        </p:nvSpPr>
+        <p:spPr/>
+        <p:txBody>
+          <a:bodyPr/>
+          <a:lstStyle/>
+          <a:p>
+            <a:fld id="{6FB4F6EA-423E-42DF-9292-215E7D886C4E}" type="slidenum">
+              <a:rPr lang="en-US" smtClean="0"/>
+              <a:pPr/>
+              <a:t>35</a:t>
             </a:fld>
             <a:endParaRPr lang="en-US" dirty="0"/>
           </a:p>
@@ -10775,37 +11591,11 @@
               </a:rPr>
               <a:t>functions</a:t>
             </a:r>
-          </a:p>
-          <a:p>
-            <a:pPr>
-              <a:lnSpc>
-                <a:spcPct val="100000"/>
-              </a:lnSpc>
-            </a:pPr>
-            <a:r>
-              <a:rPr lang="en-US" sz="2800" dirty="0" smtClean="0">
-                <a:solidFill>
-                  <a:srgbClr val="F4FCD8"/>
-                </a:solidFill>
-              </a:rPr>
-              <a:t>Naming </a:t>
-            </a:r>
-            <a:r>
-              <a:rPr lang="en-US" sz="2800" dirty="0" err="1" smtClean="0">
-                <a:solidFill>
-                  <a:srgbClr val="F4FCD8"/>
-                </a:solidFill>
-              </a:rPr>
-              <a:t>convensions</a:t>
-            </a:r>
-            <a:r>
-              <a:rPr lang="en-US" sz="2800" dirty="0" smtClean="0">
-                <a:solidFill>
-                  <a:srgbClr val="F4FCD8"/>
-                </a:solidFill>
-              </a:rPr>
-              <a:t>(move to end!!!!)</a:t>
-            </a:r>
+            <a:endParaRPr lang="en-US" sz="2800" dirty="0" smtClean="0">
+              <a:solidFill>
+                <a:srgbClr val="F4FCD8"/>
+              </a:solidFill>
+            </a:endParaRPr>
           </a:p>
         </p:txBody>
       </p:sp>
@@ -12829,7 +13619,11 @@
             </a:pPr>
             <a:r>
               <a:rPr lang="en-US" dirty="0" smtClean="0"/>
-              <a:t>PHP Language Overview</a:t>
+              <a:t>PHP Language </a:t>
+            </a:r>
+            <a:r>
+              <a:rPr lang="en-US" dirty="0" smtClean="0"/>
+              <a:t>Overview</a:t>
             </a:r>
           </a:p>
           <a:p>
@@ -12842,6 +13636,20 @@
             </a:pPr>
             <a:r>
               <a:rPr lang="en-US" dirty="0" smtClean="0"/>
+              <a:t>PHP OOP Overview</a:t>
+            </a:r>
+            <a:endParaRPr lang="en-US" dirty="0" smtClean="0"/>
+          </a:p>
+          <a:p>
+            <a:pPr marL="514350" indent="-514350">
+              <a:lnSpc>
+                <a:spcPct val="110000"/>
+              </a:lnSpc>
+              <a:buFont typeface="+mj-lt"/>
+              <a:buAutoNum type="arabicPeriod"/>
+            </a:pPr>
+            <a:r>
+              <a:rPr lang="en-US" dirty="0" smtClean="0"/>
               <a:t>Writing a PHP based Web Application</a:t>
             </a:r>
           </a:p>
@@ -12853,7 +13661,15 @@
             </a:pPr>
             <a:r>
               <a:rPr lang="en-US" dirty="0" smtClean="0"/>
-              <a:t>Using Native PHP</a:t>
+              <a:t>Using </a:t>
+            </a:r>
+            <a:r>
+              <a:rPr lang="en-US" dirty="0" smtClean="0"/>
+              <a:t>native </a:t>
+            </a:r>
+            <a:r>
+              <a:rPr lang="en-US" dirty="0" smtClean="0"/>
+              <a:t>PHP</a:t>
             </a:r>
           </a:p>
           <a:p>
@@ -17005,7 +17821,7 @@
           <p:nvPr>
             <p:extLst>
               <p:ext uri="{D42A27DB-BD31-4B8C-83A1-F6EECF244321}">
-                <p14:modId xmlns:p14="http://schemas.microsoft.com/office/powerpoint/2010/main" val="2352515367"/>
+                <p14:modId xmlns:p14="http://schemas.microsoft.com/office/powerpoint/2010/main" val="1420165081"/>
               </p:ext>
             </p:extLst>
           </p:nvPr>
@@ -17018,7 +17834,7 @@
           <a:graphicData uri="http://schemas.openxmlformats.org/drawingml/2006/table">
             <a:tbl>
               <a:tblPr firstRow="1" bandRow="1">
-                <a:tableStyleId>{22838BEF-8BB2-4498-84A7-C5851F593DF1}</a:tableStyleId>
+                <a:tableStyleId>{073A0DAA-6AF3-43AB-8588-CEC1D06C72B9}</a:tableStyleId>
               </a:tblPr>
               <a:tblGrid>
                 <a:gridCol w="2717800"/>
@@ -18529,6 +19345,1616 @@
     <p:extLst>
       <p:ext uri="{BB962C8B-B14F-4D97-AF65-F5344CB8AC3E}">
         <p14:creationId xmlns:p14="http://schemas.microsoft.com/office/powerpoint/2010/main" val="2163116254"/>
+      </p:ext>
+    </p:extLst>
+  </p:cSld>
+  <p:clrMapOvr>
+    <a:masterClrMapping/>
+  </p:clrMapOvr>
+  <p:timing>
+    <p:tnLst>
+      <p:par>
+        <p:cTn id="1" dur="indefinite" restart="never" nodeType="tmRoot"/>
+      </p:par>
+    </p:tnLst>
+  </p:timing>
+</p:sld>
+</file>
+
+<file path=ppt/slides/slide32.xml><?xml version="1.0" encoding="utf-8"?>
+<p:sld xmlns:a="http://schemas.openxmlformats.org/drawingml/2006/main" xmlns:r="http://schemas.openxmlformats.org/officeDocument/2006/relationships" xmlns:p="http://schemas.openxmlformats.org/presentationml/2006/main">
+  <p:cSld>
+    <p:spTree>
+      <p:nvGrpSpPr>
+        <p:cNvPr id="1" name=""/>
+        <p:cNvGrpSpPr/>
+        <p:nvPr/>
+      </p:nvGrpSpPr>
+      <p:grpSpPr>
+        <a:xfrm>
+          <a:off x="0" y="0"/>
+          <a:ext cx="0" cy="0"/>
+          <a:chOff x="0" y="0"/>
+          <a:chExt cx="0" cy="0"/>
+        </a:xfrm>
+      </p:grpSpPr>
+      <p:sp>
+        <p:nvSpPr>
+          <p:cNvPr id="344066" name="Rectangle 2"/>
+          <p:cNvSpPr>
+            <a:spLocks noGrp="1" noChangeArrowheads="1"/>
+          </p:cNvSpPr>
+          <p:nvPr>
+            <p:ph type="ctrTitle"/>
+          </p:nvPr>
+        </p:nvSpPr>
+        <p:spPr>
+          <a:xfrm>
+            <a:off x="609600" y="4255368"/>
+            <a:ext cx="7924800" cy="1693912"/>
+          </a:xfrm>
+        </p:spPr>
+        <p:txBody>
+          <a:bodyPr/>
+          <a:lstStyle/>
+          <a:p>
+            <a:pPr marL="514350" indent="-514350">
+              <a:lnSpc>
+                <a:spcPct val="110000"/>
+              </a:lnSpc>
+            </a:pPr>
+            <a:r>
+              <a:rPr lang="en-US" dirty="0" smtClean="0"/>
+              <a:t>PHP OOP</a:t>
+            </a:r>
+            <a:endParaRPr lang="en-US" dirty="0"/>
+          </a:p>
+        </p:txBody>
+      </p:sp>
+    </p:spTree>
+    <p:extLst>
+      <p:ext uri="{BB962C8B-B14F-4D97-AF65-F5344CB8AC3E}">
+        <p14:creationId xmlns:p14="http://schemas.microsoft.com/office/powerpoint/2010/main" val="1507035637"/>
+      </p:ext>
+    </p:extLst>
+  </p:cSld>
+  <p:clrMapOvr>
+    <a:masterClrMapping/>
+  </p:clrMapOvr>
+  <mc:AlternateContent xmlns:mc="http://schemas.openxmlformats.org/markup-compatibility/2006" xmlns:p14="http://schemas.microsoft.com/office/powerpoint/2010/main">
+    <mc:Choice Requires="p14">
+      <p:transition spd="slow" p14:dur="2000"/>
+    </mc:Choice>
+    <mc:Fallback xmlns="">
+      <p:transition spd="slow"/>
+    </mc:Fallback>
+  </mc:AlternateContent>
+  <p:timing>
+    <p:tnLst>
+      <p:par>
+        <p:cTn id="1" dur="indefinite" restart="never" nodeType="tmRoot"/>
+      </p:par>
+    </p:tnLst>
+  </p:timing>
+</p:sld>
+</file>
+
+<file path=ppt/slides/slide33.xml><?xml version="1.0" encoding="utf-8"?>
+<p:sld xmlns:a="http://schemas.openxmlformats.org/drawingml/2006/main" xmlns:r="http://schemas.openxmlformats.org/officeDocument/2006/relationships" xmlns:p="http://schemas.openxmlformats.org/presentationml/2006/main">
+  <p:cSld>
+    <p:spTree>
+      <p:nvGrpSpPr>
+        <p:cNvPr id="1" name=""/>
+        <p:cNvGrpSpPr/>
+        <p:nvPr/>
+      </p:nvGrpSpPr>
+      <p:grpSpPr>
+        <a:xfrm>
+          <a:off x="0" y="0"/>
+          <a:ext cx="0" cy="0"/>
+          <a:chOff x="0" y="0"/>
+          <a:chExt cx="0" cy="0"/>
+        </a:xfrm>
+      </p:grpSpPr>
+      <p:sp>
+        <p:nvSpPr>
+          <p:cNvPr id="2" name="Title 1"/>
+          <p:cNvSpPr>
+            <a:spLocks noGrp="1"/>
+          </p:cNvSpPr>
+          <p:nvPr>
+            <p:ph type="title"/>
+          </p:nvPr>
+        </p:nvSpPr>
+        <p:spPr>
+          <a:xfrm>
+            <a:off x="1828800" y="162086"/>
+            <a:ext cx="7086600" cy="914400"/>
+          </a:xfrm>
+        </p:spPr>
+        <p:txBody>
+          <a:bodyPr/>
+          <a:lstStyle/>
+          <a:p>
+            <a:r>
+              <a:rPr lang="en-US" dirty="0" smtClean="0"/>
+              <a:t>PHP </a:t>
+            </a:r>
+            <a:r>
+              <a:rPr lang="en-US" dirty="0" smtClean="0"/>
+              <a:t>OOP</a:t>
+            </a:r>
+            <a:endParaRPr lang="en-US" dirty="0"/>
+          </a:p>
+        </p:txBody>
+      </p:sp>
+      <p:sp>
+        <p:nvSpPr>
+          <p:cNvPr id="3" name="Content Placeholder 2"/>
+          <p:cNvSpPr>
+            <a:spLocks noGrp="1"/>
+          </p:cNvSpPr>
+          <p:nvPr>
+            <p:ph idx="1"/>
+          </p:nvPr>
+        </p:nvSpPr>
+        <p:spPr>
+          <a:xfrm>
+            <a:off x="228600" y="1371600"/>
+            <a:ext cx="8686800" cy="3651348"/>
+          </a:xfrm>
+        </p:spPr>
+        <p:txBody>
+          <a:bodyPr/>
+          <a:lstStyle/>
+          <a:p>
+            <a:pPr>
+              <a:lnSpc>
+                <a:spcPct val="100000"/>
+              </a:lnSpc>
+            </a:pPr>
+            <a:r>
+              <a:rPr lang="en-US" sz="2800" dirty="0" smtClean="0">
+                <a:solidFill>
+                  <a:srgbClr val="F4FCD8"/>
+                </a:solidFill>
+              </a:rPr>
+              <a:t>Creating a “simple” class</a:t>
+            </a:r>
+            <a:endParaRPr lang="en-US" sz="2800" dirty="0" smtClean="0">
+              <a:solidFill>
+                <a:srgbClr val="F4FCD8"/>
+              </a:solidFill>
+            </a:endParaRPr>
+          </a:p>
+          <a:p>
+            <a:pPr>
+              <a:lnSpc>
+                <a:spcPct val="100000"/>
+              </a:lnSpc>
+            </a:pPr>
+            <a:r>
+              <a:rPr lang="en-US" sz="2800" dirty="0" smtClean="0">
+                <a:solidFill>
+                  <a:srgbClr val="F4FCD8"/>
+                </a:solidFill>
+              </a:rPr>
+              <a:t>Extending classes</a:t>
+            </a:r>
+            <a:endParaRPr lang="en-US" sz="2800" dirty="0" smtClean="0">
+              <a:solidFill>
+                <a:srgbClr val="F4FCD8"/>
+              </a:solidFill>
+            </a:endParaRPr>
+          </a:p>
+          <a:p>
+            <a:pPr>
+              <a:lnSpc>
+                <a:spcPct val="100000"/>
+              </a:lnSpc>
+            </a:pPr>
+            <a:r>
+              <a:rPr lang="en-US" sz="2800" dirty="0" smtClean="0">
+                <a:solidFill>
+                  <a:srgbClr val="F4FCD8"/>
+                </a:solidFill>
+              </a:rPr>
+              <a:t>Utility classes</a:t>
+            </a:r>
+            <a:endParaRPr lang="en-US" sz="2800" dirty="0" smtClean="0">
+              <a:solidFill>
+                <a:srgbClr val="F4FCD8"/>
+              </a:solidFill>
+            </a:endParaRPr>
+          </a:p>
+          <a:p>
+            <a:pPr>
+              <a:lnSpc>
+                <a:spcPct val="100000"/>
+              </a:lnSpc>
+            </a:pPr>
+            <a:r>
+              <a:rPr lang="en-US" sz="2800" dirty="0" smtClean="0">
+                <a:solidFill>
+                  <a:srgbClr val="F4FCD8"/>
+                </a:solidFill>
+              </a:rPr>
+              <a:t>Interfaces</a:t>
+            </a:r>
+            <a:endParaRPr lang="en-US" sz="2800" dirty="0" smtClean="0">
+              <a:solidFill>
+                <a:srgbClr val="F4FCD8"/>
+              </a:solidFill>
+            </a:endParaRPr>
+          </a:p>
+          <a:p>
+            <a:pPr>
+              <a:lnSpc>
+                <a:spcPct val="100000"/>
+              </a:lnSpc>
+            </a:pPr>
+            <a:r>
+              <a:rPr lang="en-US" sz="2800" dirty="0" smtClean="0">
+                <a:solidFill>
+                  <a:srgbClr val="F4FCD8"/>
+                </a:solidFill>
+              </a:rPr>
+              <a:t>Enumeration like abstract classes</a:t>
+            </a:r>
+            <a:endParaRPr lang="en-US" sz="2800" dirty="0" smtClean="0">
+              <a:solidFill>
+                <a:srgbClr val="F4FCD8"/>
+              </a:solidFill>
+            </a:endParaRPr>
+          </a:p>
+          <a:p>
+            <a:pPr>
+              <a:lnSpc>
+                <a:spcPct val="100000"/>
+              </a:lnSpc>
+            </a:pPr>
+            <a:r>
+              <a:rPr lang="en-US" sz="2800" dirty="0" smtClean="0">
+                <a:solidFill>
+                  <a:srgbClr val="F4FCD8"/>
+                </a:solidFill>
+              </a:rPr>
+              <a:t>Using design patterns</a:t>
+            </a:r>
+          </a:p>
+          <a:p>
+            <a:pPr>
+              <a:lnSpc>
+                <a:spcPct val="100000"/>
+              </a:lnSpc>
+            </a:pPr>
+            <a:r>
+              <a:rPr lang="en-US" sz="2800" dirty="0" smtClean="0">
+                <a:solidFill>
+                  <a:srgbClr val="F4FCD8"/>
+                </a:solidFill>
+              </a:rPr>
+              <a:t>Naming </a:t>
+            </a:r>
+            <a:r>
+              <a:rPr lang="en-US" sz="2800" dirty="0" err="1" smtClean="0">
+                <a:solidFill>
+                  <a:srgbClr val="F4FCD8"/>
+                </a:solidFill>
+              </a:rPr>
+              <a:t>convensions</a:t>
+            </a:r>
+            <a:endParaRPr lang="en-US" sz="2800" dirty="0" smtClean="0">
+              <a:solidFill>
+                <a:srgbClr val="F4FCD8"/>
+              </a:solidFill>
+            </a:endParaRPr>
+          </a:p>
+        </p:txBody>
+      </p:sp>
+    </p:spTree>
+    <p:extLst>
+      <p:ext uri="{BB962C8B-B14F-4D97-AF65-F5344CB8AC3E}">
+        <p14:creationId xmlns:p14="http://schemas.microsoft.com/office/powerpoint/2010/main" val="2737008221"/>
+      </p:ext>
+    </p:extLst>
+  </p:cSld>
+  <p:clrMapOvr>
+    <a:masterClrMapping/>
+  </p:clrMapOvr>
+  <p:timing>
+    <p:tnLst>
+      <p:par>
+        <p:cTn id="1" dur="indefinite" restart="never" nodeType="tmRoot"/>
+      </p:par>
+    </p:tnLst>
+  </p:timing>
+</p:sld>
+</file>
+
+<file path=ppt/slides/slide34.xml><?xml version="1.0" encoding="utf-8"?>
+<p:sld xmlns:a="http://schemas.openxmlformats.org/drawingml/2006/main" xmlns:r="http://schemas.openxmlformats.org/officeDocument/2006/relationships" xmlns:p="http://schemas.openxmlformats.org/presentationml/2006/main">
+  <p:cSld>
+    <p:spTree>
+      <p:nvGrpSpPr>
+        <p:cNvPr id="1" name=""/>
+        <p:cNvGrpSpPr/>
+        <p:nvPr/>
+      </p:nvGrpSpPr>
+      <p:grpSpPr>
+        <a:xfrm>
+          <a:off x="0" y="0"/>
+          <a:ext cx="0" cy="0"/>
+          <a:chOff x="0" y="0"/>
+          <a:chExt cx="0" cy="0"/>
+        </a:xfrm>
+      </p:grpSpPr>
+      <p:sp>
+        <p:nvSpPr>
+          <p:cNvPr id="2" name="Title 1"/>
+          <p:cNvSpPr>
+            <a:spLocks noGrp="1"/>
+          </p:cNvSpPr>
+          <p:nvPr>
+            <p:ph type="title"/>
+          </p:nvPr>
+        </p:nvSpPr>
+        <p:spPr>
+          <a:xfrm>
+            <a:off x="1828800" y="162086"/>
+            <a:ext cx="7086600" cy="914400"/>
+          </a:xfrm>
+        </p:spPr>
+        <p:txBody>
+          <a:bodyPr/>
+          <a:lstStyle/>
+          <a:p>
+            <a:r>
+              <a:rPr lang="en-US" dirty="0" smtClean="0"/>
+              <a:t>Naming </a:t>
+            </a:r>
+            <a:r>
+              <a:rPr lang="en-US" dirty="0" err="1" smtClean="0"/>
+              <a:t>convensions</a:t>
+            </a:r>
+            <a:endParaRPr lang="en-US" dirty="0"/>
+          </a:p>
+        </p:txBody>
+      </p:sp>
+      <p:graphicFrame>
+        <p:nvGraphicFramePr>
+          <p:cNvPr id="6" name="Контейнер за съдържание 5"/>
+          <p:cNvGraphicFramePr>
+            <a:graphicFrameLocks noGrp="1"/>
+          </p:cNvGraphicFramePr>
+          <p:nvPr>
+            <p:ph idx="1"/>
+            <p:extLst>
+              <p:ext uri="{D42A27DB-BD31-4B8C-83A1-F6EECF244321}">
+                <p14:modId xmlns:p14="http://schemas.microsoft.com/office/powerpoint/2010/main" val="3978952508"/>
+              </p:ext>
+            </p:extLst>
+          </p:nvPr>
+        </p:nvGraphicFramePr>
+        <p:xfrm>
+          <a:off x="457200" y="2438400"/>
+          <a:ext cx="8229600" cy="3230436"/>
+        </p:xfrm>
+        <a:graphic>
+          <a:graphicData uri="http://schemas.openxmlformats.org/drawingml/2006/table">
+            <a:tbl>
+              <a:tblPr firstRow="1" bandRow="1">
+                <a:tableStyleId>{073A0DAA-6AF3-43AB-8588-CEC1D06C72B9}</a:tableStyleId>
+              </a:tblPr>
+              <a:tblGrid>
+                <a:gridCol w="1371600"/>
+                <a:gridCol w="1371600"/>
+                <a:gridCol w="1371600"/>
+                <a:gridCol w="1371600"/>
+                <a:gridCol w="1371600"/>
+                <a:gridCol w="1371600"/>
+              </a:tblGrid>
+              <a:tr h="375191">
+                <a:tc>
+                  <a:txBody>
+                    <a:bodyPr/>
+                    <a:lstStyle/>
+                    <a:p>
+                      <a:r>
+                        <a:rPr lang="en-GB" dirty="0" smtClean="0"/>
+                        <a:t> PHP Project </a:t>
+                      </a:r>
+                      <a:endParaRPr lang="bg-BG" dirty="0"/>
+                    </a:p>
+                  </a:txBody>
+                  <a:tcPr/>
+                </a:tc>
+                <a:tc>
+                  <a:txBody>
+                    <a:bodyPr/>
+                    <a:lstStyle/>
+                    <a:p>
+                      <a:r>
+                        <a:rPr lang="en-GB" dirty="0" smtClean="0"/>
+                        <a:t>Classes</a:t>
+                      </a:r>
+                      <a:endParaRPr lang="bg-BG" dirty="0"/>
+                    </a:p>
+                  </a:txBody>
+                  <a:tcPr/>
+                </a:tc>
+                <a:tc>
+                  <a:txBody>
+                    <a:bodyPr/>
+                    <a:lstStyle/>
+                    <a:p>
+                      <a:r>
+                        <a:rPr lang="en-GB" dirty="0" smtClean="0"/>
+                        <a:t>Methods</a:t>
+                      </a:r>
+                      <a:endParaRPr lang="bg-BG" dirty="0"/>
+                    </a:p>
+                  </a:txBody>
+                  <a:tcPr/>
+                </a:tc>
+                <a:tc>
+                  <a:txBody>
+                    <a:bodyPr/>
+                    <a:lstStyle/>
+                    <a:p>
+                      <a:r>
+                        <a:rPr lang="en-GB" dirty="0" smtClean="0"/>
+                        <a:t>Properties</a:t>
+                      </a:r>
+                      <a:endParaRPr lang="bg-BG" dirty="0"/>
+                    </a:p>
+                  </a:txBody>
+                  <a:tcPr/>
+                </a:tc>
+                <a:tc>
+                  <a:txBody>
+                    <a:bodyPr/>
+                    <a:lstStyle/>
+                    <a:p>
+                      <a:r>
+                        <a:rPr lang="en-GB" dirty="0" smtClean="0"/>
+                        <a:t>Functions</a:t>
+                      </a:r>
+                      <a:endParaRPr lang="bg-BG" dirty="0"/>
+                    </a:p>
+                  </a:txBody>
+                  <a:tcPr/>
+                </a:tc>
+                <a:tc>
+                  <a:txBody>
+                    <a:bodyPr/>
+                    <a:lstStyle/>
+                    <a:p>
+                      <a:r>
+                        <a:rPr lang="en-GB" dirty="0" smtClean="0"/>
+                        <a:t>Variables</a:t>
+                      </a:r>
+                      <a:endParaRPr lang="bg-BG" dirty="0"/>
+                    </a:p>
+                  </a:txBody>
+                  <a:tcPr/>
+                </a:tc>
+              </a:tr>
+              <a:tr h="647589">
+                <a:tc>
+                  <a:txBody>
+                    <a:bodyPr/>
+                    <a:lstStyle/>
+                    <a:p>
+                      <a:r>
+                        <a:rPr lang="en-GB" dirty="0" err="1" smtClean="0"/>
+                        <a:t>CakePHP</a:t>
+                      </a:r>
+                      <a:r>
+                        <a:rPr lang="en-GB" dirty="0" smtClean="0"/>
+                        <a:t> Framework</a:t>
+                      </a:r>
+                      <a:endParaRPr lang="bg-BG" dirty="0"/>
+                    </a:p>
+                  </a:txBody>
+                  <a:tcPr/>
+                </a:tc>
+                <a:tc>
+                  <a:txBody>
+                    <a:bodyPr/>
+                    <a:lstStyle/>
+                    <a:p>
+                      <a:r>
+                        <a:rPr lang="en-GB" dirty="0" err="1" smtClean="0"/>
+                        <a:t>PascalCase</a:t>
+                      </a:r>
+                      <a:endParaRPr lang="bg-BG" dirty="0"/>
+                    </a:p>
+                  </a:txBody>
+                  <a:tcPr/>
+                </a:tc>
+                <a:tc>
+                  <a:txBody>
+                    <a:bodyPr/>
+                    <a:lstStyle/>
+                    <a:p>
+                      <a:r>
+                        <a:rPr lang="en-GB" dirty="0" err="1" smtClean="0"/>
+                        <a:t>camelCase</a:t>
+                      </a:r>
+                      <a:endParaRPr lang="bg-BG" dirty="0"/>
+                    </a:p>
+                  </a:txBody>
+                  <a:tcPr/>
+                </a:tc>
+                <a:tc>
+                  <a:txBody>
+                    <a:bodyPr/>
+                    <a:lstStyle/>
+                    <a:p>
+                      <a:r>
+                        <a:rPr lang="en-GB" dirty="0" err="1" smtClean="0"/>
+                        <a:t>camelCase</a:t>
+                      </a:r>
+                      <a:endParaRPr lang="bg-BG" dirty="0"/>
+                    </a:p>
+                  </a:txBody>
+                  <a:tcPr/>
+                </a:tc>
+                <a:tc>
+                  <a:txBody>
+                    <a:bodyPr/>
+                    <a:lstStyle/>
+                    <a:p>
+                      <a:r>
+                        <a:rPr lang="en-GB" dirty="0" err="1" smtClean="0"/>
+                        <a:t>camelCase</a:t>
+                      </a:r>
+                      <a:endParaRPr lang="bg-BG" dirty="0"/>
+                    </a:p>
+                  </a:txBody>
+                  <a:tcPr/>
+                </a:tc>
+                <a:tc>
+                  <a:txBody>
+                    <a:bodyPr/>
+                    <a:lstStyle/>
+                    <a:p>
+                      <a:r>
+                        <a:rPr lang="en-GB" dirty="0" err="1" smtClean="0"/>
+                        <a:t>camelCase</a:t>
+                      </a:r>
+                      <a:endParaRPr lang="bg-BG" dirty="0"/>
+                    </a:p>
+                  </a:txBody>
+                  <a:tcPr/>
+                </a:tc>
+              </a:tr>
+              <a:tr h="647589">
+                <a:tc>
+                  <a:txBody>
+                    <a:bodyPr/>
+                    <a:lstStyle/>
+                    <a:p>
+                      <a:r>
+                        <a:rPr lang="en-GB" dirty="0" err="1" smtClean="0"/>
+                        <a:t>CodeIgniter</a:t>
+                      </a:r>
+                      <a:r>
+                        <a:rPr lang="en-GB" dirty="0" smtClean="0"/>
+                        <a:t> Framework</a:t>
+                      </a:r>
+                      <a:endParaRPr lang="bg-BG" dirty="0"/>
+                    </a:p>
+                  </a:txBody>
+                  <a:tcPr/>
+                </a:tc>
+                <a:tc>
+                  <a:txBody>
+                    <a:bodyPr/>
+                    <a:lstStyle/>
+                    <a:p>
+                      <a:r>
+                        <a:rPr lang="en-US" dirty="0" err="1" smtClean="0"/>
+                        <a:t>Proper_Case</a:t>
+                      </a:r>
+                      <a:endParaRPr lang="bg-BG" dirty="0"/>
+                    </a:p>
+                  </a:txBody>
+                  <a:tcPr/>
+                </a:tc>
+                <a:tc>
+                  <a:txBody>
+                    <a:bodyPr/>
+                    <a:lstStyle/>
+                    <a:p>
+                      <a:r>
+                        <a:rPr lang="en-US" dirty="0" err="1" smtClean="0"/>
+                        <a:t>lower_case</a:t>
+                      </a:r>
+                      <a:r>
+                        <a:rPr lang="en-US" dirty="0" smtClean="0"/>
+                        <a:t> </a:t>
+                      </a:r>
+                      <a:endParaRPr lang="bg-BG" dirty="0"/>
+                    </a:p>
+                  </a:txBody>
+                  <a:tcPr/>
+                </a:tc>
+                <a:tc>
+                  <a:txBody>
+                    <a:bodyPr/>
+                    <a:lstStyle/>
+                    <a:p>
+                      <a:r>
+                        <a:rPr lang="en-US" dirty="0" err="1" smtClean="0"/>
+                        <a:t>lower_case</a:t>
+                      </a:r>
+                      <a:r>
+                        <a:rPr lang="en-US" dirty="0" smtClean="0"/>
+                        <a:t> </a:t>
+                      </a:r>
+                      <a:endParaRPr lang="bg-BG" dirty="0"/>
+                    </a:p>
+                  </a:txBody>
+                  <a:tcPr/>
+                </a:tc>
+                <a:tc>
+                  <a:txBody>
+                    <a:bodyPr/>
+                    <a:lstStyle/>
+                    <a:p>
+                      <a:r>
+                        <a:rPr lang="en-US" dirty="0" err="1" smtClean="0"/>
+                        <a:t>lower_case</a:t>
+                      </a:r>
+                      <a:r>
+                        <a:rPr lang="en-US" dirty="0" smtClean="0"/>
+                        <a:t> </a:t>
+                      </a:r>
+                      <a:endParaRPr lang="bg-BG" dirty="0"/>
+                    </a:p>
+                  </a:txBody>
+                  <a:tcPr/>
+                </a:tc>
+                <a:tc>
+                  <a:txBody>
+                    <a:bodyPr/>
+                    <a:lstStyle/>
+                    <a:p>
+                      <a:r>
+                        <a:rPr lang="en-US" dirty="0" err="1" smtClean="0"/>
+                        <a:t>lower_case</a:t>
+                      </a:r>
+                      <a:r>
+                        <a:rPr lang="en-US" dirty="0" smtClean="0"/>
+                        <a:t> </a:t>
+                      </a:r>
+                      <a:endParaRPr lang="bg-BG" dirty="0"/>
+                    </a:p>
+                  </a:txBody>
+                  <a:tcPr/>
+                </a:tc>
+              </a:tr>
+              <a:tr h="647589">
+                <a:tc>
+                  <a:txBody>
+                    <a:bodyPr/>
+                    <a:lstStyle/>
+                    <a:p>
+                      <a:r>
+                        <a:rPr lang="en-GB" dirty="0" err="1" smtClean="0"/>
+                        <a:t>Symfony</a:t>
+                      </a:r>
+                      <a:r>
+                        <a:rPr lang="en-GB" dirty="0" smtClean="0"/>
+                        <a:t> Framework</a:t>
+                      </a:r>
+                      <a:endParaRPr lang="bg-BG" dirty="0"/>
+                    </a:p>
+                  </a:txBody>
+                  <a:tcPr/>
+                </a:tc>
+                <a:tc>
+                  <a:txBody>
+                    <a:bodyPr/>
+                    <a:lstStyle/>
+                    <a:p>
+                      <a:r>
+                        <a:rPr lang="en-GB" dirty="0" err="1" smtClean="0"/>
+                        <a:t>PascalCase</a:t>
+                      </a:r>
+                      <a:endParaRPr lang="bg-BG" dirty="0"/>
+                    </a:p>
+                  </a:txBody>
+                  <a:tcPr/>
+                </a:tc>
+                <a:tc>
+                  <a:txBody>
+                    <a:bodyPr/>
+                    <a:lstStyle/>
+                    <a:p>
+                      <a:r>
+                        <a:rPr lang="en-GB" dirty="0" err="1" smtClean="0"/>
+                        <a:t>camelCase</a:t>
+                      </a:r>
+                      <a:endParaRPr lang="bg-BG" dirty="0"/>
+                    </a:p>
+                  </a:txBody>
+                  <a:tcPr/>
+                </a:tc>
+                <a:tc>
+                  <a:txBody>
+                    <a:bodyPr/>
+                    <a:lstStyle/>
+                    <a:p>
+                      <a:r>
+                        <a:rPr lang="en-GB" dirty="0" err="1" smtClean="0"/>
+                        <a:t>camelCase</a:t>
+                      </a:r>
+                      <a:endParaRPr lang="bg-BG" dirty="0"/>
+                    </a:p>
+                  </a:txBody>
+                  <a:tcPr/>
+                </a:tc>
+                <a:tc>
+                  <a:txBody>
+                    <a:bodyPr/>
+                    <a:lstStyle/>
+                    <a:p>
+                      <a:r>
+                        <a:rPr lang="en-GB" dirty="0" err="1" smtClean="0"/>
+                        <a:t>camelCase</a:t>
+                      </a:r>
+                      <a:endParaRPr lang="bg-BG" dirty="0"/>
+                    </a:p>
+                  </a:txBody>
+                  <a:tcPr/>
+                </a:tc>
+                <a:tc>
+                  <a:txBody>
+                    <a:bodyPr/>
+                    <a:lstStyle/>
+                    <a:p>
+                      <a:r>
+                        <a:rPr lang="en-GB" dirty="0" err="1" smtClean="0"/>
+                        <a:t>camelCase</a:t>
+                      </a:r>
+                      <a:endParaRPr lang="bg-BG" dirty="0"/>
+                    </a:p>
+                  </a:txBody>
+                  <a:tcPr/>
+                </a:tc>
+              </a:tr>
+              <a:tr h="647589">
+                <a:tc>
+                  <a:txBody>
+                    <a:bodyPr/>
+                    <a:lstStyle/>
+                    <a:p>
+                      <a:r>
+                        <a:rPr lang="en-GB" dirty="0" err="1" smtClean="0"/>
+                        <a:t>Zend</a:t>
+                      </a:r>
+                      <a:r>
+                        <a:rPr lang="en-GB" dirty="0" smtClean="0"/>
+                        <a:t> Framework </a:t>
+                      </a:r>
+                      <a:endParaRPr lang="bg-BG" dirty="0"/>
+                    </a:p>
+                  </a:txBody>
+                  <a:tcPr/>
+                </a:tc>
+                <a:tc>
+                  <a:txBody>
+                    <a:bodyPr/>
+                    <a:lstStyle/>
+                    <a:p>
+                      <a:r>
+                        <a:rPr lang="en-GB" dirty="0" err="1" smtClean="0"/>
+                        <a:t>PascalCase</a:t>
+                      </a:r>
+                      <a:r>
+                        <a:rPr lang="en-GB" dirty="0" smtClean="0"/>
+                        <a:t> </a:t>
+                      </a:r>
+                      <a:endParaRPr lang="bg-BG" dirty="0"/>
+                    </a:p>
+                  </a:txBody>
+                  <a:tcPr/>
+                </a:tc>
+                <a:tc>
+                  <a:txBody>
+                    <a:bodyPr/>
+                    <a:lstStyle/>
+                    <a:p>
+                      <a:r>
+                        <a:rPr lang="en-GB" dirty="0" err="1" smtClean="0"/>
+                        <a:t>camelCase</a:t>
+                      </a:r>
+                      <a:r>
+                        <a:rPr lang="en-GB" dirty="0" smtClean="0"/>
+                        <a:t> </a:t>
+                      </a:r>
+                      <a:endParaRPr lang="bg-BG" dirty="0"/>
+                    </a:p>
+                  </a:txBody>
+                  <a:tcPr/>
+                </a:tc>
+                <a:tc>
+                  <a:txBody>
+                    <a:bodyPr/>
+                    <a:lstStyle/>
+                    <a:p>
+                      <a:r>
+                        <a:rPr lang="en-GB" dirty="0" err="1" smtClean="0"/>
+                        <a:t>camelCase</a:t>
+                      </a:r>
+                      <a:r>
+                        <a:rPr lang="en-GB" dirty="0" smtClean="0"/>
+                        <a:t> </a:t>
+                      </a:r>
+                      <a:endParaRPr lang="bg-BG" dirty="0"/>
+                    </a:p>
+                  </a:txBody>
+                  <a:tcPr/>
+                </a:tc>
+                <a:tc>
+                  <a:txBody>
+                    <a:bodyPr/>
+                    <a:lstStyle/>
+                    <a:p>
+                      <a:r>
+                        <a:rPr lang="en-GB" dirty="0" err="1" smtClean="0"/>
+                        <a:t>camelCase</a:t>
+                      </a:r>
+                      <a:r>
+                        <a:rPr lang="en-GB" dirty="0" smtClean="0"/>
+                        <a:t> </a:t>
+                      </a:r>
+                      <a:endParaRPr lang="bg-BG" dirty="0"/>
+                    </a:p>
+                  </a:txBody>
+                  <a:tcPr/>
+                </a:tc>
+                <a:tc>
+                  <a:txBody>
+                    <a:bodyPr/>
+                    <a:lstStyle/>
+                    <a:p>
+                      <a:r>
+                        <a:rPr lang="en-GB" dirty="0" err="1" smtClean="0"/>
+                        <a:t>camelCase</a:t>
+                      </a:r>
+                      <a:r>
+                        <a:rPr lang="en-GB" dirty="0" smtClean="0"/>
+                        <a:t> </a:t>
+                      </a:r>
+                      <a:endParaRPr lang="bg-BG" dirty="0"/>
+                    </a:p>
+                  </a:txBody>
+                  <a:tcPr/>
+                </a:tc>
+              </a:tr>
+            </a:tbl>
+          </a:graphicData>
+        </a:graphic>
+      </p:graphicFrame>
+      <p:sp>
+        <p:nvSpPr>
+          <p:cNvPr id="9" name="Content Placeholder 2"/>
+          <p:cNvSpPr txBox="1">
+            <a:spLocks/>
+          </p:cNvSpPr>
+          <p:nvPr/>
+        </p:nvSpPr>
+        <p:spPr>
+          <a:xfrm>
+            <a:off x="228600" y="1606452"/>
+            <a:ext cx="5562600" cy="3651348"/>
+          </a:xfrm>
+          <a:prstGeom prst="rect">
+            <a:avLst/>
+          </a:prstGeom>
+        </p:spPr>
+        <p:txBody>
+          <a:bodyPr/>
+          <a:lstStyle>
+            <a:lvl1pPr marL="282575" indent="-282575" algn="l" rtl="0" eaLnBrk="0" fontAlgn="base" hangingPunct="0">
+              <a:lnSpc>
+                <a:spcPct val="105000"/>
+              </a:lnSpc>
+              <a:spcBef>
+                <a:spcPts val="600"/>
+              </a:spcBef>
+              <a:spcAft>
+                <a:spcPts val="600"/>
+              </a:spcAft>
+              <a:buClr>
+                <a:schemeClr val="accent5">
+                  <a:lumMod val="40000"/>
+                  <a:lumOff val="60000"/>
+                </a:schemeClr>
+              </a:buClr>
+              <a:buSzPct val="70000"/>
+              <a:buFont typeface="Wingdings 2" pitchFamily="18" charset="2"/>
+              <a:buChar char=""/>
+              <a:tabLst>
+                <a:tab pos="282575" algn="l"/>
+              </a:tabLst>
+              <a:defRPr sz="3200" b="1" kern="1200">
+                <a:solidFill>
+                  <a:srgbClr val="EBFFD2"/>
+                </a:solidFill>
+                <a:effectLst>
+                  <a:outerShdw blurRad="38100" dist="38100" dir="2700000" algn="tl">
+                    <a:srgbClr val="000000">
+                      <a:alpha val="43137"/>
+                    </a:srgbClr>
+                  </a:outerShdw>
+                </a:effectLst>
+                <a:latin typeface="+mn-lt"/>
+                <a:ea typeface="+mn-ea"/>
+                <a:cs typeface="+mn-cs"/>
+              </a:defRPr>
+            </a:lvl1pPr>
+            <a:lvl2pPr marL="630238" indent="-273050" algn="l" rtl="0" eaLnBrk="0" fontAlgn="base" hangingPunct="0">
+              <a:lnSpc>
+                <a:spcPct val="105000"/>
+              </a:lnSpc>
+              <a:spcBef>
+                <a:spcPts val="600"/>
+              </a:spcBef>
+              <a:spcAft>
+                <a:spcPts val="600"/>
+              </a:spcAft>
+              <a:buClr>
+                <a:srgbClr val="8FD600"/>
+              </a:buClr>
+              <a:buFont typeface="Wingdings 2" pitchFamily="18" charset="2"/>
+              <a:buChar char=""/>
+              <a:defRPr sz="3000" b="1" kern="1200">
+                <a:solidFill>
+                  <a:schemeClr val="tx1">
+                    <a:lumMod val="40000"/>
+                    <a:lumOff val="60000"/>
+                  </a:schemeClr>
+                </a:solidFill>
+                <a:effectLst>
+                  <a:outerShdw blurRad="38100" dist="38100" dir="2700000" algn="tl">
+                    <a:srgbClr val="000000">
+                      <a:alpha val="43137"/>
+                    </a:srgbClr>
+                  </a:outerShdw>
+                </a:effectLst>
+                <a:latin typeface="+mn-lt"/>
+                <a:ea typeface="+mn-ea"/>
+                <a:cs typeface="+mn-cs"/>
+              </a:defRPr>
+            </a:lvl2pPr>
+            <a:lvl3pPr marL="922338" indent="-273050" algn="l" rtl="0" eaLnBrk="0" fontAlgn="base" hangingPunct="0">
+              <a:lnSpc>
+                <a:spcPct val="105000"/>
+              </a:lnSpc>
+              <a:spcBef>
+                <a:spcPts val="600"/>
+              </a:spcBef>
+              <a:spcAft>
+                <a:spcPts val="600"/>
+              </a:spcAft>
+              <a:buClr>
+                <a:srgbClr val="FFAD9F"/>
+              </a:buClr>
+              <a:buFont typeface="Wingdings 2" pitchFamily="18" charset="2"/>
+              <a:buChar char=""/>
+              <a:defRPr sz="2800" b="1" kern="1200">
+                <a:solidFill>
+                  <a:srgbClr val="F5FFC2"/>
+                </a:solidFill>
+                <a:effectLst>
+                  <a:outerShdw blurRad="38100" dist="38100" dir="2700000" algn="tl">
+                    <a:srgbClr val="000000">
+                      <a:alpha val="43137"/>
+                    </a:srgbClr>
+                  </a:outerShdw>
+                </a:effectLst>
+                <a:latin typeface="+mn-lt"/>
+                <a:ea typeface="+mn-ea"/>
+                <a:cs typeface="+mn-cs"/>
+              </a:defRPr>
+            </a:lvl3pPr>
+            <a:lvl4pPr marL="1187450" indent="-228600" algn="l" rtl="0" eaLnBrk="0" fontAlgn="base" hangingPunct="0">
+              <a:lnSpc>
+                <a:spcPct val="105000"/>
+              </a:lnSpc>
+              <a:spcBef>
+                <a:spcPts val="600"/>
+              </a:spcBef>
+              <a:spcAft>
+                <a:spcPts val="600"/>
+              </a:spcAft>
+              <a:buClr>
+                <a:srgbClr val="FACF82"/>
+              </a:buClr>
+              <a:buFont typeface="Wingdings 2" pitchFamily="18" charset="2"/>
+              <a:buChar char=""/>
+              <a:defRPr sz="2600" b="1" kern="1200">
+                <a:solidFill>
+                  <a:schemeClr val="tx1">
+                    <a:lumMod val="40000"/>
+                    <a:lumOff val="60000"/>
+                  </a:schemeClr>
+                </a:solidFill>
+                <a:effectLst>
+                  <a:outerShdw blurRad="38100" dist="38100" dir="2700000" algn="tl">
+                    <a:srgbClr val="000000">
+                      <a:alpha val="43137"/>
+                    </a:srgbClr>
+                  </a:outerShdw>
+                </a:effectLst>
+                <a:latin typeface="+mn-lt"/>
+                <a:ea typeface="+mn-ea"/>
+                <a:cs typeface="+mn-cs"/>
+              </a:defRPr>
+            </a:lvl4pPr>
+            <a:lvl5pPr marL="1425575" indent="-228600" algn="l" rtl="0" eaLnBrk="0" fontAlgn="base" hangingPunct="0">
+              <a:lnSpc>
+                <a:spcPct val="105000"/>
+              </a:lnSpc>
+              <a:spcBef>
+                <a:spcPts val="600"/>
+              </a:spcBef>
+              <a:spcAft>
+                <a:spcPts val="600"/>
+              </a:spcAft>
+              <a:buClr>
+                <a:srgbClr val="46A6BD"/>
+              </a:buClr>
+              <a:buFont typeface="Wingdings 2" pitchFamily="18" charset="2"/>
+              <a:buChar char=""/>
+              <a:defRPr sz="2400" b="1" kern="1200">
+                <a:solidFill>
+                  <a:schemeClr val="tx1">
+                    <a:lumMod val="40000"/>
+                    <a:lumOff val="60000"/>
+                  </a:schemeClr>
+                </a:solidFill>
+                <a:effectLst>
+                  <a:outerShdw blurRad="38100" dist="38100" dir="2700000" algn="tl">
+                    <a:srgbClr val="000000">
+                      <a:alpha val="43137"/>
+                    </a:srgbClr>
+                  </a:outerShdw>
+                </a:effectLst>
+                <a:latin typeface="+mn-lt"/>
+                <a:ea typeface="+mn-ea"/>
+                <a:cs typeface="+mn-cs"/>
+              </a:defRPr>
+            </a:lvl5pPr>
+            <a:lvl6pPr marL="1673352" indent="-228600" algn="l" rtl="0" eaLnBrk="1" latinLnBrk="0" hangingPunct="1">
+              <a:spcBef>
+                <a:spcPct val="20000"/>
+              </a:spcBef>
+              <a:buClr>
+                <a:schemeClr val="accent6"/>
+              </a:buClr>
+              <a:buFont typeface="Wingdings 2"/>
+              <a:buChar char=""/>
+              <a:defRPr sz="1800" kern="1200">
+                <a:solidFill>
+                  <a:schemeClr val="tx1"/>
+                </a:solidFill>
+                <a:latin typeface="+mn-lt"/>
+                <a:ea typeface="+mn-ea"/>
+                <a:cs typeface="+mn-cs"/>
+              </a:defRPr>
+            </a:lvl6pPr>
+            <a:lvl7pPr marL="1911096" indent="-228600" algn="l" rtl="0" eaLnBrk="1" latinLnBrk="0" hangingPunct="1">
+              <a:spcBef>
+                <a:spcPct val="20000"/>
+              </a:spcBef>
+              <a:buClr>
+                <a:schemeClr val="tx2"/>
+              </a:buClr>
+              <a:buFont typeface="Wingdings 2"/>
+              <a:buChar char=""/>
+              <a:defRPr sz="1600" kern="1200">
+                <a:solidFill>
+                  <a:schemeClr val="tx1"/>
+                </a:solidFill>
+                <a:latin typeface="+mn-lt"/>
+                <a:ea typeface="+mn-ea"/>
+                <a:cs typeface="+mn-cs"/>
+              </a:defRPr>
+            </a:lvl7pPr>
+            <a:lvl8pPr marL="2121408" indent="-182880" algn="l" rtl="0" eaLnBrk="1" latinLnBrk="0" hangingPunct="1">
+              <a:spcBef>
+                <a:spcPct val="20000"/>
+              </a:spcBef>
+              <a:buClr>
+                <a:schemeClr val="tx2"/>
+              </a:buClr>
+              <a:buFont typeface="Wingdings 2"/>
+              <a:buChar char=""/>
+              <a:defRPr sz="1400" kern="1200">
+                <a:solidFill>
+                  <a:schemeClr val="tx1"/>
+                </a:solidFill>
+                <a:latin typeface="+mn-lt"/>
+                <a:ea typeface="+mn-ea"/>
+                <a:cs typeface="+mn-cs"/>
+              </a:defRPr>
+            </a:lvl8pPr>
+            <a:lvl9pPr marL="2322576" indent="-182880" algn="l" rtl="0" eaLnBrk="1" latinLnBrk="0" hangingPunct="1">
+              <a:spcBef>
+                <a:spcPct val="20000"/>
+              </a:spcBef>
+              <a:buClr>
+                <a:schemeClr val="tx2"/>
+              </a:buClr>
+              <a:buFont typeface="Wingdings 2"/>
+              <a:buChar char=""/>
+              <a:defRPr sz="1400" kern="1200">
+                <a:solidFill>
+                  <a:schemeClr val="tx1"/>
+                </a:solidFill>
+                <a:latin typeface="+mn-lt"/>
+                <a:ea typeface="+mn-ea"/>
+                <a:cs typeface="+mn-cs"/>
+              </a:defRPr>
+            </a:lvl9pPr>
+          </a:lstStyle>
+          <a:p>
+            <a:pPr>
+              <a:lnSpc>
+                <a:spcPct val="100000"/>
+              </a:lnSpc>
+            </a:pPr>
+            <a:r>
+              <a:rPr lang="en-US" dirty="0" smtClean="0"/>
+              <a:t>Depends on the project</a:t>
+            </a:r>
+            <a:endParaRPr lang="en-US" dirty="0" smtClean="0"/>
+          </a:p>
+        </p:txBody>
+      </p:sp>
+    </p:spTree>
+    <p:extLst>
+      <p:ext uri="{BB962C8B-B14F-4D97-AF65-F5344CB8AC3E}">
+        <p14:creationId xmlns:p14="http://schemas.microsoft.com/office/powerpoint/2010/main" val="3269492465"/>
+      </p:ext>
+    </p:extLst>
+  </p:cSld>
+  <p:clrMapOvr>
+    <a:masterClrMapping/>
+  </p:clrMapOvr>
+  <p:timing>
+    <p:tnLst>
+      <p:par>
+        <p:cTn id="1" dur="indefinite" restart="never" nodeType="tmRoot"/>
+      </p:par>
+    </p:tnLst>
+  </p:timing>
+</p:sld>
+</file>
+
+<file path=ppt/slides/slide35.xml><?xml version="1.0" encoding="utf-8"?>
+<p:sld xmlns:a="http://schemas.openxmlformats.org/drawingml/2006/main" xmlns:r="http://schemas.openxmlformats.org/officeDocument/2006/relationships" xmlns:p="http://schemas.openxmlformats.org/presentationml/2006/main">
+  <p:cSld>
+    <p:spTree>
+      <p:nvGrpSpPr>
+        <p:cNvPr id="1" name=""/>
+        <p:cNvGrpSpPr/>
+        <p:nvPr/>
+      </p:nvGrpSpPr>
+      <p:grpSpPr>
+        <a:xfrm>
+          <a:off x="0" y="0"/>
+          <a:ext cx="0" cy="0"/>
+          <a:chOff x="0" y="0"/>
+          <a:chExt cx="0" cy="0"/>
+        </a:xfrm>
+      </p:grpSpPr>
+      <p:sp>
+        <p:nvSpPr>
+          <p:cNvPr id="2" name="Title 1"/>
+          <p:cNvSpPr>
+            <a:spLocks noGrp="1"/>
+          </p:cNvSpPr>
+          <p:nvPr>
+            <p:ph type="title"/>
+          </p:nvPr>
+        </p:nvSpPr>
+        <p:spPr>
+          <a:xfrm>
+            <a:off x="1828800" y="162086"/>
+            <a:ext cx="7086600" cy="914400"/>
+          </a:xfrm>
+        </p:spPr>
+        <p:txBody>
+          <a:bodyPr/>
+          <a:lstStyle/>
+          <a:p>
+            <a:r>
+              <a:rPr lang="en-US" dirty="0" smtClean="0"/>
+              <a:t>Naming </a:t>
+            </a:r>
+            <a:r>
+              <a:rPr lang="en-US" dirty="0" err="1" smtClean="0"/>
+              <a:t>convensions</a:t>
+            </a:r>
+            <a:r>
+              <a:rPr lang="en-US" dirty="0" smtClean="0"/>
+              <a:t>(2)</a:t>
+            </a:r>
+            <a:endParaRPr lang="en-US" dirty="0"/>
+          </a:p>
+        </p:txBody>
+      </p:sp>
+      <p:sp>
+        <p:nvSpPr>
+          <p:cNvPr id="9" name="Content Placeholder 2"/>
+          <p:cNvSpPr txBox="1">
+            <a:spLocks/>
+          </p:cNvSpPr>
+          <p:nvPr/>
+        </p:nvSpPr>
+        <p:spPr>
+          <a:xfrm>
+            <a:off x="228600" y="1295400"/>
+            <a:ext cx="5562600" cy="3651348"/>
+          </a:xfrm>
+          <a:prstGeom prst="rect">
+            <a:avLst/>
+          </a:prstGeom>
+        </p:spPr>
+        <p:txBody>
+          <a:bodyPr/>
+          <a:lstStyle>
+            <a:lvl1pPr marL="282575" indent="-282575" algn="l" rtl="0" eaLnBrk="0" fontAlgn="base" hangingPunct="0">
+              <a:lnSpc>
+                <a:spcPct val="105000"/>
+              </a:lnSpc>
+              <a:spcBef>
+                <a:spcPts val="600"/>
+              </a:spcBef>
+              <a:spcAft>
+                <a:spcPts val="600"/>
+              </a:spcAft>
+              <a:buClr>
+                <a:schemeClr val="accent5">
+                  <a:lumMod val="40000"/>
+                  <a:lumOff val="60000"/>
+                </a:schemeClr>
+              </a:buClr>
+              <a:buSzPct val="70000"/>
+              <a:buFont typeface="Wingdings 2" pitchFamily="18" charset="2"/>
+              <a:buChar char=""/>
+              <a:tabLst>
+                <a:tab pos="282575" algn="l"/>
+              </a:tabLst>
+              <a:defRPr sz="3200" b="1" kern="1200">
+                <a:solidFill>
+                  <a:srgbClr val="EBFFD2"/>
+                </a:solidFill>
+                <a:effectLst>
+                  <a:outerShdw blurRad="38100" dist="38100" dir="2700000" algn="tl">
+                    <a:srgbClr val="000000">
+                      <a:alpha val="43137"/>
+                    </a:srgbClr>
+                  </a:outerShdw>
+                </a:effectLst>
+                <a:latin typeface="+mn-lt"/>
+                <a:ea typeface="+mn-ea"/>
+                <a:cs typeface="+mn-cs"/>
+              </a:defRPr>
+            </a:lvl1pPr>
+            <a:lvl2pPr marL="630238" indent="-273050" algn="l" rtl="0" eaLnBrk="0" fontAlgn="base" hangingPunct="0">
+              <a:lnSpc>
+                <a:spcPct val="105000"/>
+              </a:lnSpc>
+              <a:spcBef>
+                <a:spcPts val="600"/>
+              </a:spcBef>
+              <a:spcAft>
+                <a:spcPts val="600"/>
+              </a:spcAft>
+              <a:buClr>
+                <a:srgbClr val="8FD600"/>
+              </a:buClr>
+              <a:buFont typeface="Wingdings 2" pitchFamily="18" charset="2"/>
+              <a:buChar char=""/>
+              <a:defRPr sz="3000" b="1" kern="1200">
+                <a:solidFill>
+                  <a:schemeClr val="tx1">
+                    <a:lumMod val="40000"/>
+                    <a:lumOff val="60000"/>
+                  </a:schemeClr>
+                </a:solidFill>
+                <a:effectLst>
+                  <a:outerShdw blurRad="38100" dist="38100" dir="2700000" algn="tl">
+                    <a:srgbClr val="000000">
+                      <a:alpha val="43137"/>
+                    </a:srgbClr>
+                  </a:outerShdw>
+                </a:effectLst>
+                <a:latin typeface="+mn-lt"/>
+                <a:ea typeface="+mn-ea"/>
+                <a:cs typeface="+mn-cs"/>
+              </a:defRPr>
+            </a:lvl2pPr>
+            <a:lvl3pPr marL="922338" indent="-273050" algn="l" rtl="0" eaLnBrk="0" fontAlgn="base" hangingPunct="0">
+              <a:lnSpc>
+                <a:spcPct val="105000"/>
+              </a:lnSpc>
+              <a:spcBef>
+                <a:spcPts val="600"/>
+              </a:spcBef>
+              <a:spcAft>
+                <a:spcPts val="600"/>
+              </a:spcAft>
+              <a:buClr>
+                <a:srgbClr val="FFAD9F"/>
+              </a:buClr>
+              <a:buFont typeface="Wingdings 2" pitchFamily="18" charset="2"/>
+              <a:buChar char=""/>
+              <a:defRPr sz="2800" b="1" kern="1200">
+                <a:solidFill>
+                  <a:srgbClr val="F5FFC2"/>
+                </a:solidFill>
+                <a:effectLst>
+                  <a:outerShdw blurRad="38100" dist="38100" dir="2700000" algn="tl">
+                    <a:srgbClr val="000000">
+                      <a:alpha val="43137"/>
+                    </a:srgbClr>
+                  </a:outerShdw>
+                </a:effectLst>
+                <a:latin typeface="+mn-lt"/>
+                <a:ea typeface="+mn-ea"/>
+                <a:cs typeface="+mn-cs"/>
+              </a:defRPr>
+            </a:lvl3pPr>
+            <a:lvl4pPr marL="1187450" indent="-228600" algn="l" rtl="0" eaLnBrk="0" fontAlgn="base" hangingPunct="0">
+              <a:lnSpc>
+                <a:spcPct val="105000"/>
+              </a:lnSpc>
+              <a:spcBef>
+                <a:spcPts val="600"/>
+              </a:spcBef>
+              <a:spcAft>
+                <a:spcPts val="600"/>
+              </a:spcAft>
+              <a:buClr>
+                <a:srgbClr val="FACF82"/>
+              </a:buClr>
+              <a:buFont typeface="Wingdings 2" pitchFamily="18" charset="2"/>
+              <a:buChar char=""/>
+              <a:defRPr sz="2600" b="1" kern="1200">
+                <a:solidFill>
+                  <a:schemeClr val="tx1">
+                    <a:lumMod val="40000"/>
+                    <a:lumOff val="60000"/>
+                  </a:schemeClr>
+                </a:solidFill>
+                <a:effectLst>
+                  <a:outerShdw blurRad="38100" dist="38100" dir="2700000" algn="tl">
+                    <a:srgbClr val="000000">
+                      <a:alpha val="43137"/>
+                    </a:srgbClr>
+                  </a:outerShdw>
+                </a:effectLst>
+                <a:latin typeface="+mn-lt"/>
+                <a:ea typeface="+mn-ea"/>
+                <a:cs typeface="+mn-cs"/>
+              </a:defRPr>
+            </a:lvl4pPr>
+            <a:lvl5pPr marL="1425575" indent="-228600" algn="l" rtl="0" eaLnBrk="0" fontAlgn="base" hangingPunct="0">
+              <a:lnSpc>
+                <a:spcPct val="105000"/>
+              </a:lnSpc>
+              <a:spcBef>
+                <a:spcPts val="600"/>
+              </a:spcBef>
+              <a:spcAft>
+                <a:spcPts val="600"/>
+              </a:spcAft>
+              <a:buClr>
+                <a:srgbClr val="46A6BD"/>
+              </a:buClr>
+              <a:buFont typeface="Wingdings 2" pitchFamily="18" charset="2"/>
+              <a:buChar char=""/>
+              <a:defRPr sz="2400" b="1" kern="1200">
+                <a:solidFill>
+                  <a:schemeClr val="tx1">
+                    <a:lumMod val="40000"/>
+                    <a:lumOff val="60000"/>
+                  </a:schemeClr>
+                </a:solidFill>
+                <a:effectLst>
+                  <a:outerShdw blurRad="38100" dist="38100" dir="2700000" algn="tl">
+                    <a:srgbClr val="000000">
+                      <a:alpha val="43137"/>
+                    </a:srgbClr>
+                  </a:outerShdw>
+                </a:effectLst>
+                <a:latin typeface="+mn-lt"/>
+                <a:ea typeface="+mn-ea"/>
+                <a:cs typeface="+mn-cs"/>
+              </a:defRPr>
+            </a:lvl5pPr>
+            <a:lvl6pPr marL="1673352" indent="-228600" algn="l" rtl="0" eaLnBrk="1" latinLnBrk="0" hangingPunct="1">
+              <a:spcBef>
+                <a:spcPct val="20000"/>
+              </a:spcBef>
+              <a:buClr>
+                <a:schemeClr val="accent6"/>
+              </a:buClr>
+              <a:buFont typeface="Wingdings 2"/>
+              <a:buChar char=""/>
+              <a:defRPr sz="1800" kern="1200">
+                <a:solidFill>
+                  <a:schemeClr val="tx1"/>
+                </a:solidFill>
+                <a:latin typeface="+mn-lt"/>
+                <a:ea typeface="+mn-ea"/>
+                <a:cs typeface="+mn-cs"/>
+              </a:defRPr>
+            </a:lvl6pPr>
+            <a:lvl7pPr marL="1911096" indent="-228600" algn="l" rtl="0" eaLnBrk="1" latinLnBrk="0" hangingPunct="1">
+              <a:spcBef>
+                <a:spcPct val="20000"/>
+              </a:spcBef>
+              <a:buClr>
+                <a:schemeClr val="tx2"/>
+              </a:buClr>
+              <a:buFont typeface="Wingdings 2"/>
+              <a:buChar char=""/>
+              <a:defRPr sz="1600" kern="1200">
+                <a:solidFill>
+                  <a:schemeClr val="tx1"/>
+                </a:solidFill>
+                <a:latin typeface="+mn-lt"/>
+                <a:ea typeface="+mn-ea"/>
+                <a:cs typeface="+mn-cs"/>
+              </a:defRPr>
+            </a:lvl7pPr>
+            <a:lvl8pPr marL="2121408" indent="-182880" algn="l" rtl="0" eaLnBrk="1" latinLnBrk="0" hangingPunct="1">
+              <a:spcBef>
+                <a:spcPct val="20000"/>
+              </a:spcBef>
+              <a:buClr>
+                <a:schemeClr val="tx2"/>
+              </a:buClr>
+              <a:buFont typeface="Wingdings 2"/>
+              <a:buChar char=""/>
+              <a:defRPr sz="1400" kern="1200">
+                <a:solidFill>
+                  <a:schemeClr val="tx1"/>
+                </a:solidFill>
+                <a:latin typeface="+mn-lt"/>
+                <a:ea typeface="+mn-ea"/>
+                <a:cs typeface="+mn-cs"/>
+              </a:defRPr>
+            </a:lvl8pPr>
+            <a:lvl9pPr marL="2322576" indent="-182880" algn="l" rtl="0" eaLnBrk="1" latinLnBrk="0" hangingPunct="1">
+              <a:spcBef>
+                <a:spcPct val="20000"/>
+              </a:spcBef>
+              <a:buClr>
+                <a:schemeClr val="tx2"/>
+              </a:buClr>
+              <a:buFont typeface="Wingdings 2"/>
+              <a:buChar char=""/>
+              <a:defRPr sz="1400" kern="1200">
+                <a:solidFill>
+                  <a:schemeClr val="tx1"/>
+                </a:solidFill>
+                <a:latin typeface="+mn-lt"/>
+                <a:ea typeface="+mn-ea"/>
+                <a:cs typeface="+mn-cs"/>
+              </a:defRPr>
+            </a:lvl9pPr>
+          </a:lstStyle>
+          <a:p>
+            <a:pPr>
+              <a:lnSpc>
+                <a:spcPct val="100000"/>
+              </a:lnSpc>
+            </a:pPr>
+            <a:r>
+              <a:rPr lang="en-US" dirty="0" smtClean="0"/>
+              <a:t>Go with</a:t>
+            </a:r>
+          </a:p>
+          <a:p>
+            <a:pPr lvl="1">
+              <a:lnSpc>
+                <a:spcPct val="100000"/>
+              </a:lnSpc>
+            </a:pPr>
+            <a:r>
+              <a:rPr lang="en-US" dirty="0" err="1" smtClean="0"/>
+              <a:t>ClassName</a:t>
+            </a:r>
+            <a:endParaRPr lang="en-US" dirty="0"/>
+          </a:p>
+          <a:p>
+            <a:pPr lvl="1">
+              <a:lnSpc>
+                <a:spcPct val="100000"/>
+              </a:lnSpc>
+            </a:pPr>
+            <a:r>
+              <a:rPr lang="en-US" dirty="0" err="1" smtClean="0"/>
+              <a:t>methodName</a:t>
+            </a:r>
+            <a:endParaRPr lang="en-US" dirty="0"/>
+          </a:p>
+          <a:p>
+            <a:pPr lvl="1">
+              <a:lnSpc>
+                <a:spcPct val="100000"/>
+              </a:lnSpc>
+            </a:pPr>
+            <a:r>
+              <a:rPr lang="en-US" dirty="0" err="1" smtClean="0"/>
+              <a:t>propertyName</a:t>
+            </a:r>
+            <a:endParaRPr lang="en-US" dirty="0"/>
+          </a:p>
+          <a:p>
+            <a:pPr lvl="1">
+              <a:lnSpc>
+                <a:spcPct val="100000"/>
+              </a:lnSpc>
+            </a:pPr>
+            <a:r>
+              <a:rPr lang="en-US" dirty="0" err="1" smtClean="0"/>
+              <a:t>function_name</a:t>
+            </a:r>
+            <a:r>
+              <a:rPr lang="en-US" dirty="0" smtClean="0"/>
+              <a:t> </a:t>
+            </a:r>
+            <a:r>
+              <a:rPr lang="en-US" dirty="0"/>
+              <a:t>(meant for global functions)</a:t>
+            </a:r>
+          </a:p>
+          <a:p>
+            <a:pPr lvl="1">
+              <a:lnSpc>
+                <a:spcPct val="100000"/>
+              </a:lnSpc>
+            </a:pPr>
+            <a:r>
+              <a:rPr lang="en-US" dirty="0" smtClean="0"/>
+              <a:t>$</a:t>
+            </a:r>
+            <a:r>
+              <a:rPr lang="en-US" dirty="0" err="1"/>
+              <a:t>variable_name</a:t>
+            </a:r>
+            <a:endParaRPr lang="en-US" dirty="0"/>
+          </a:p>
+          <a:p>
+            <a:pPr lvl="1">
+              <a:lnSpc>
+                <a:spcPct val="100000"/>
+              </a:lnSpc>
+            </a:pPr>
+            <a:r>
+              <a:rPr lang="en-US" dirty="0" err="1" smtClean="0"/>
+              <a:t>iInterfaceName</a:t>
+            </a:r>
+            <a:endParaRPr lang="en-US" dirty="0" smtClean="0"/>
+          </a:p>
+        </p:txBody>
+      </p:sp>
+    </p:spTree>
+    <p:extLst>
+      <p:ext uri="{BB962C8B-B14F-4D97-AF65-F5344CB8AC3E}">
+        <p14:creationId xmlns:p14="http://schemas.microsoft.com/office/powerpoint/2010/main" val="181046617"/>
       </p:ext>
     </p:extLst>
   </p:cSld>

</xml_diff>

<commit_message>
Made more progress on presentatiaon
</commit_message>
<xml_diff>
--- a/PHP_MVC.pptx
+++ b/PHP_MVC.pptx
@@ -5,10 +5,10 @@
     <p:sldMasterId id="2147483672" r:id="rId1"/>
   </p:sldMasterIdLst>
   <p:notesMasterIdLst>
-    <p:notesMasterId r:id="rId54"/>
+    <p:notesMasterId r:id="rId55"/>
   </p:notesMasterIdLst>
   <p:handoutMasterIdLst>
-    <p:handoutMasterId r:id="rId55"/>
+    <p:handoutMasterId r:id="rId56"/>
   </p:handoutMasterIdLst>
   <p:sldIdLst>
     <p:sldId id="382" r:id="rId2"/>
@@ -63,6 +63,7 @@
     <p:sldId id="458" r:id="rId51"/>
     <p:sldId id="452" r:id="rId52"/>
     <p:sldId id="453" r:id="rId53"/>
+    <p:sldId id="460" r:id="rId54"/>
   </p:sldIdLst>
   <p:sldSz cx="9144000" cy="6858000" type="screen4x3"/>
   <p:notesSz cx="6881813" cy="9296400"/>
@@ -193,7 +194,7 @@
   </p:defaultTextStyle>
   <p:extLst>
     <p:ext uri="{EFAFB233-063F-42B5-8137-9DF3F51BA10A}">
-      <p15:sldGuideLst xmlns:p15="http://schemas.microsoft.com/office/powerpoint/2012/main" xmlns="">
+      <p15:sldGuideLst xmlns="" xmlns:p15="http://schemas.microsoft.com/office/powerpoint/2012/main">
         <p15:guide id="1" orient="horz" pos="2160">
           <p15:clr>
             <a:srgbClr val="A4A3A4"/>
@@ -207,7 +208,7 @@
       </p15:sldGuideLst>
     </p:ext>
     <p:ext uri="{2D200454-40CA-4A62-9FC3-DE9A4176ACB9}">
-      <p15:notesGuideLst xmlns:p15="http://schemas.microsoft.com/office/powerpoint/2012/main" xmlns="">
+      <p15:notesGuideLst xmlns="" xmlns:p15="http://schemas.microsoft.com/office/powerpoint/2012/main">
         <p15:guide id="1" orient="horz" pos="2928">
           <p15:clr>
             <a:srgbClr val="A4A3A4"/>
@@ -339,7 +340,7 @@
             <a:fld id="{3BF7C7B5-275F-4D1F-9AB4-9255447DBC73}" type="datetimeFigureOut">
               <a:rPr lang="en-US"/>
               <a:pPr/>
-              <a:t>11/10/2014</a:t>
+              <a:t>11/11/2014</a:t>
             </a:fld>
             <a:endParaRPr lang="en-US" dirty="0"/>
           </a:p>
@@ -570,7 +571,7 @@
             <a:fld id="{9B46F231-FB2B-4655-A644-E2477325E686}" type="datetimeFigureOut">
               <a:rPr lang="en-US"/>
               <a:pPr/>
-              <a:t>11/10/2014</a:t>
+              <a:t>11/11/2014</a:t>
             </a:fld>
             <a:endParaRPr lang="en-US" dirty="0"/>
           </a:p>
@@ -1201,7 +1202,7 @@
                 </a:solidFill>
               </a:rPr>
               <a:pPr/>
-              <a:t>11/10/2014</a:t>
+              <a:t>11/11/2014</a:t>
             </a:fld>
             <a:r>
               <a:rPr lang="en-US" sz="1100" b="0" dirty="0">
@@ -1843,7 +1844,7 @@
                 </a:solidFill>
               </a:rPr>
               <a:pPr/>
-              <a:t>11/10/2014</a:t>
+              <a:t>11/11/2014</a:t>
             </a:fld>
             <a:r>
               <a:rPr lang="en-US" sz="1100" b="0" dirty="0">
@@ -2485,7 +2486,7 @@
                 </a:solidFill>
               </a:rPr>
               <a:pPr/>
-              <a:t>11/10/2014</a:t>
+              <a:t>11/11/2014</a:t>
             </a:fld>
             <a:r>
               <a:rPr lang="en-US" sz="1100" b="0" dirty="0">
@@ -3127,7 +3128,7 @@
                 </a:solidFill>
               </a:rPr>
               <a:pPr/>
-              <a:t>11/10/2014</a:t>
+              <a:t>11/11/2014</a:t>
             </a:fld>
             <a:r>
               <a:rPr lang="en-US" sz="1100" b="0" dirty="0">
@@ -3769,7 +3770,7 @@
                 </a:solidFill>
               </a:rPr>
               <a:pPr/>
-              <a:t>11/10/2014</a:t>
+              <a:t>11/11/2014</a:t>
             </a:fld>
             <a:r>
               <a:rPr lang="en-US" sz="1100" b="0" dirty="0">
@@ -4411,7 +4412,7 @@
                 </a:solidFill>
               </a:rPr>
               <a:pPr/>
-              <a:t>11/10/2014</a:t>
+              <a:t>11/11/2014</a:t>
             </a:fld>
             <a:r>
               <a:rPr lang="en-US" sz="1100" b="0" dirty="0">
@@ -5138,7 +5139,7 @@
                 </a:solidFill>
               </a:rPr>
               <a:pPr/>
-              <a:t>11/10/2014</a:t>
+              <a:t>11/11/2014</a:t>
             </a:fld>
             <a:r>
               <a:rPr lang="en-US" sz="1100" b="0" dirty="0">
@@ -5950,7 +5951,7 @@
                 </a:solidFill>
               </a:rPr>
               <a:pPr/>
-              <a:t>11/10/2014</a:t>
+              <a:t>11/11/2014</a:t>
             </a:fld>
             <a:r>
               <a:rPr lang="en-US" sz="1100" b="0" dirty="0">
@@ -29839,7 +29840,6 @@
               <a:rPr lang="en-US" dirty="0"/>
               <a:t>Writing a native PHP application</a:t>
             </a:r>
-            <a:endParaRPr lang="en-US" dirty="0"/>
           </a:p>
         </p:txBody>
       </p:sp>
@@ -31816,11 +31816,7 @@
           <a:p>
             <a:r>
               <a:rPr lang="en-US" dirty="0" smtClean="0"/>
-              <a:t>Generating </a:t>
-            </a:r>
-            <a:r>
-              <a:rPr lang="en-US" dirty="0" smtClean="0"/>
-              <a:t> HTML</a:t>
+              <a:t>Generating  HTML</a:t>
             </a:r>
             <a:endParaRPr lang="en-US" dirty="0"/>
           </a:p>
@@ -33528,7 +33524,6 @@
               <a:rPr lang="en-US" dirty="0" smtClean="0"/>
               <a:t> functions</a:t>
             </a:r>
-            <a:endParaRPr lang="en-US" dirty="0" smtClean="0"/>
           </a:p>
           <a:p>
             <a:pPr lvl="1">
@@ -33790,20 +33785,6 @@
               </a:rPr>
               <a:t> &lt;/li&gt;</a:t>
             </a:r>
-            <a:endParaRPr lang="en-US" sz="1400" b="1" noProof="1" smtClean="0">
-              <a:solidFill>
-                <a:srgbClr val="8CF4F2"/>
-              </a:solidFill>
-              <a:effectLst>
-                <a:outerShdw blurRad="38100" dist="38100" dir="2700000" algn="tl">
-                  <a:srgbClr val="000000">
-                    <a:alpha val="43137"/>
-                  </a:srgbClr>
-                </a:outerShdw>
-              </a:effectLst>
-              <a:latin typeface="Consolas" pitchFamily="49" charset="0"/>
-              <a:cs typeface="Consolas" pitchFamily="49" charset="0"/>
-            </a:endParaRPr>
           </a:p>
           <a:p>
             <a:pPr>
@@ -33904,24 +33885,7 @@
                 <a:latin typeface="Consolas" pitchFamily="49" charset="0"/>
                 <a:cs typeface="Consolas" pitchFamily="49" charset="0"/>
               </a:rPr>
-              <a:t>  &lt;/</a:t>
-            </a:r>
-            <a:r>
-              <a:rPr lang="en-US" sz="1400" b="1" noProof="1">
-                <a:solidFill>
-                  <a:srgbClr val="8CF4F2"/>
-                </a:solidFill>
-                <a:effectLst>
-                  <a:outerShdw blurRad="38100" dist="38100" dir="2700000" algn="tl">
-                    <a:srgbClr val="000000">
-                      <a:alpha val="43137"/>
-                    </a:srgbClr>
-                  </a:outerShdw>
-                </a:effectLst>
-                <a:latin typeface="Consolas" pitchFamily="49" charset="0"/>
-                <a:cs typeface="Consolas" pitchFamily="49" charset="0"/>
-              </a:rPr>
-              <a:t>li</a:t>
+              <a:t>  &lt;/li</a:t>
             </a:r>
             <a:r>
               <a:rPr lang="en-US" sz="1400" b="1" noProof="1" smtClean="0">
@@ -34006,24 +33970,7 @@
                 <a:latin typeface="Consolas" pitchFamily="49" charset="0"/>
                 <a:cs typeface="Consolas" pitchFamily="49" charset="0"/>
               </a:rPr>
-              <a:t>    &lt;a </a:t>
-            </a:r>
-            <a:r>
-              <a:rPr lang="en-US" sz="1400" b="1" noProof="1">
-                <a:solidFill>
-                  <a:srgbClr val="8CF4F2"/>
-                </a:solidFill>
-                <a:effectLst>
-                  <a:outerShdw blurRad="38100" dist="38100" dir="2700000" algn="tl">
-                    <a:srgbClr val="000000">
-                      <a:alpha val="43137"/>
-                    </a:srgbClr>
-                  </a:outerShdw>
-                </a:effectLst>
-                <a:latin typeface="Consolas" pitchFamily="49" charset="0"/>
-                <a:cs typeface="Consolas" pitchFamily="49" charset="0"/>
-              </a:rPr>
-              <a:t>href</a:t>
+              <a:t>    &lt;a href</a:t>
             </a:r>
             <a:r>
               <a:rPr lang="en-US" sz="1400" b="1" noProof="1" smtClean="0">
@@ -34091,24 +34038,7 @@
                 <a:latin typeface="Consolas" pitchFamily="49" charset="0"/>
                 <a:cs typeface="Consolas" pitchFamily="49" charset="0"/>
               </a:rPr>
-              <a:t>  &lt;/</a:t>
-            </a:r>
-            <a:r>
-              <a:rPr lang="en-US" sz="1400" b="1" noProof="1">
-                <a:solidFill>
-                  <a:srgbClr val="8CF4F2"/>
-                </a:solidFill>
-                <a:effectLst>
-                  <a:outerShdw blurRad="38100" dist="38100" dir="2700000" algn="tl">
-                    <a:srgbClr val="000000">
-                      <a:alpha val="43137"/>
-                    </a:srgbClr>
-                  </a:outerShdw>
-                </a:effectLst>
-                <a:latin typeface="Consolas" pitchFamily="49" charset="0"/>
-                <a:cs typeface="Consolas" pitchFamily="49" charset="0"/>
-              </a:rPr>
-              <a:t>li</a:t>
+              <a:t>  &lt;/li</a:t>
             </a:r>
             <a:r>
               <a:rPr lang="en-US" sz="1400" b="1" noProof="1" smtClean="0">
@@ -34372,6 +34302,173 @@
       <p:transition spd="slow"/>
     </mc:Fallback>
   </mc:AlternateContent>
+  <p:timing>
+    <p:tnLst>
+      <p:par>
+        <p:cTn id="1" dur="indefinite" restart="never" nodeType="tmRoot"/>
+      </p:par>
+    </p:tnLst>
+  </p:timing>
+</p:sld>
+</file>
+
+<file path=ppt/slides/slide53.xml><?xml version="1.0" encoding="utf-8"?>
+<p:sld xmlns:a="http://schemas.openxmlformats.org/drawingml/2006/main" xmlns:r="http://schemas.openxmlformats.org/officeDocument/2006/relationships" xmlns:p="http://schemas.openxmlformats.org/presentationml/2006/main">
+  <p:cSld>
+    <p:spTree>
+      <p:nvGrpSpPr>
+        <p:cNvPr id="1" name=""/>
+        <p:cNvGrpSpPr/>
+        <p:nvPr/>
+      </p:nvGrpSpPr>
+      <p:grpSpPr>
+        <a:xfrm>
+          <a:off x="0" y="0"/>
+          <a:ext cx="0" cy="0"/>
+          <a:chOff x="0" y="0"/>
+          <a:chExt cx="0" cy="0"/>
+        </a:xfrm>
+      </p:grpSpPr>
+      <p:sp>
+        <p:nvSpPr>
+          <p:cNvPr id="2" name="Title 1"/>
+          <p:cNvSpPr>
+            <a:spLocks noGrp="1"/>
+          </p:cNvSpPr>
+          <p:nvPr>
+            <p:ph type="title"/>
+          </p:nvPr>
+        </p:nvSpPr>
+        <p:spPr>
+          <a:xfrm>
+            <a:off x="1828800" y="162086"/>
+            <a:ext cx="7086600" cy="914400"/>
+          </a:xfrm>
+        </p:spPr>
+        <p:txBody>
+          <a:bodyPr/>
+          <a:lstStyle/>
+          <a:p>
+            <a:r>
+              <a:rPr lang="en-US" dirty="0"/>
+              <a:t>Using </a:t>
+            </a:r>
+            <a:r>
+              <a:rPr lang="en-US" dirty="0" err="1"/>
+              <a:t>Laravel</a:t>
+            </a:r>
+            <a:r>
+              <a:rPr lang="en-US" dirty="0"/>
+              <a:t> MVC</a:t>
+            </a:r>
+            <a:endParaRPr lang="en-US" dirty="0"/>
+          </a:p>
+        </p:txBody>
+      </p:sp>
+      <p:sp>
+        <p:nvSpPr>
+          <p:cNvPr id="3" name="Content Placeholder 2"/>
+          <p:cNvSpPr>
+            <a:spLocks noGrp="1"/>
+          </p:cNvSpPr>
+          <p:nvPr>
+            <p:ph idx="1"/>
+          </p:nvPr>
+        </p:nvSpPr>
+        <p:spPr>
+          <a:xfrm>
+            <a:off x="228600" y="1219200"/>
+            <a:ext cx="8686800" cy="3651348"/>
+          </a:xfrm>
+        </p:spPr>
+        <p:txBody>
+          <a:bodyPr/>
+          <a:lstStyle/>
+          <a:p>
+            <a:pPr>
+              <a:lnSpc>
+                <a:spcPct val="100000"/>
+              </a:lnSpc>
+            </a:pPr>
+            <a:r>
+              <a:rPr lang="en-US" dirty="0" smtClean="0">
+                <a:solidFill>
+                  <a:srgbClr val="F4FCD8"/>
+                </a:solidFill>
+              </a:rPr>
+              <a:t>First PHP script</a:t>
+            </a:r>
+          </a:p>
+          <a:p>
+            <a:pPr>
+              <a:lnSpc>
+                <a:spcPct val="100000"/>
+              </a:lnSpc>
+            </a:pPr>
+            <a:r>
+              <a:rPr lang="en-US" dirty="0" smtClean="0">
+                <a:solidFill>
+                  <a:srgbClr val="F4FCD8"/>
+                </a:solidFill>
+              </a:rPr>
+              <a:t>Fetching data</a:t>
+            </a:r>
+          </a:p>
+          <a:p>
+            <a:pPr>
+              <a:lnSpc>
+                <a:spcPct val="100000"/>
+              </a:lnSpc>
+            </a:pPr>
+            <a:r>
+              <a:rPr lang="en-US" dirty="0"/>
+              <a:t>Generating </a:t>
+            </a:r>
+            <a:r>
+              <a:rPr lang="en-US" dirty="0" smtClean="0"/>
+              <a:t>HTML</a:t>
+            </a:r>
+          </a:p>
+          <a:p>
+            <a:pPr>
+              <a:lnSpc>
+                <a:spcPct val="100000"/>
+              </a:lnSpc>
+            </a:pPr>
+            <a:r>
+              <a:rPr lang="en-US" dirty="0"/>
+              <a:t>Connecting files</a:t>
+            </a:r>
+            <a:endParaRPr lang="en-US" dirty="0" smtClean="0">
+              <a:solidFill>
+                <a:srgbClr val="F4FCD8"/>
+              </a:solidFill>
+            </a:endParaRPr>
+          </a:p>
+          <a:p>
+            <a:pPr>
+              <a:lnSpc>
+                <a:spcPct val="100000"/>
+              </a:lnSpc>
+            </a:pPr>
+            <a:endParaRPr lang="en-US" dirty="0" smtClean="0">
+              <a:solidFill>
+                <a:srgbClr val="F4FCD8"/>
+              </a:solidFill>
+            </a:endParaRPr>
+          </a:p>
+        </p:txBody>
+      </p:sp>
+    </p:spTree>
+    <p:extLst>
+      <p:ext uri="{BB962C8B-B14F-4D97-AF65-F5344CB8AC3E}">
+        <p14:creationId xmlns:p14="http://schemas.microsoft.com/office/powerpoint/2010/main" val="1135914032"/>
+      </p:ext>
+    </p:extLst>
+  </p:cSld>
+  <p:clrMapOvr>
+    <a:masterClrMapping/>
+  </p:clrMapOvr>
   <p:timing>
     <p:tnLst>
       <p:par>

</xml_diff>